<commit_message>
added salary predictions to ppt and updated rmd
</commit_message>
<xml_diff>
--- a/Attrition Study.pptx
+++ b/Attrition Study.pptx
@@ -10,6 +10,8 @@
     <p:sldId id="258" r:id="rId4"/>
     <p:sldId id="259" r:id="rId5"/>
     <p:sldId id="260" r:id="rId6"/>
+    <p:sldId id="262" r:id="rId7"/>
+    <p:sldId id="261" r:id="rId8"/>
   </p:sldIdLst>
   <p:sldSz cx="12192000" cy="6858000"/>
   <p:notesSz cx="6858000" cy="9144000"/>
@@ -3516,10 +3518,10 @@
       </p:grpSpPr>
       <p:pic>
         <p:nvPicPr>
-          <p:cNvPr id="5" name="Content Placeholder 4" descr="A screenshot of a cell phone&#10;&#10;Description automatically generated">
-            <a:extLst>
-              <a:ext uri="{FF2B5EF4-FFF2-40B4-BE49-F238E27FC236}">
-                <a16:creationId xmlns:a16="http://schemas.microsoft.com/office/drawing/2014/main" id="{D001CF63-C862-4E14-9CF8-97CB7B806C31}"/>
+          <p:cNvPr id="9" name="Content Placeholder 8" descr="A screenshot of a cell phone&#10;&#10;Description automatically generated">
+            <a:extLst>
+              <a:ext uri="{FF2B5EF4-FFF2-40B4-BE49-F238E27FC236}">
+                <a16:creationId xmlns:a16="http://schemas.microsoft.com/office/drawing/2014/main" id="{17028F14-C00F-4951-9328-D62B9189665D}"/>
               </a:ext>
             </a:extLst>
           </p:cNvPr>
@@ -3544,11 +3546,524 @@
         </p:blipFill>
         <p:spPr>
           <a:xfrm>
-            <a:off x="1125092" y="352539"/>
-            <a:ext cx="9941816" cy="6391167"/>
+            <a:off x="3456606" y="432606"/>
+            <a:ext cx="8572514" cy="6100395"/>
           </a:xfrm>
         </p:spPr>
       </p:pic>
+      <p:graphicFrame>
+        <p:nvGraphicFramePr>
+          <p:cNvPr id="10" name="Table 9">
+            <a:extLst>
+              <a:ext uri="{FF2B5EF4-FFF2-40B4-BE49-F238E27FC236}">
+                <a16:creationId xmlns:a16="http://schemas.microsoft.com/office/drawing/2014/main" id="{87ED5878-3DAD-414D-BA9C-D4965D800D76}"/>
+              </a:ext>
+            </a:extLst>
+          </p:cNvPr>
+          <p:cNvGraphicFramePr>
+            <a:graphicFrameLocks noGrp="1"/>
+          </p:cNvGraphicFramePr>
+          <p:nvPr>
+            <p:extLst>
+              <p:ext uri="{D42A27DB-BD31-4B8C-83A1-F6EECF244321}">
+                <p14:modId xmlns:p14="http://schemas.microsoft.com/office/powerpoint/2010/main" val="4074898544"/>
+              </p:ext>
+            </p:extLst>
+          </p:nvPr>
+        </p:nvGraphicFramePr>
+        <p:xfrm>
+          <a:off x="162880" y="1027027"/>
+          <a:ext cx="3494720" cy="2257720"/>
+        </p:xfrm>
+        <a:graphic>
+          <a:graphicData uri="http://schemas.openxmlformats.org/drawingml/2006/table">
+            <a:tbl>
+              <a:tblPr>
+                <a:tableStyleId>{5C22544A-7EE6-4342-B048-85BDC9FD1C3A}</a:tableStyleId>
+              </a:tblPr>
+              <a:tblGrid>
+                <a:gridCol w="1144576">
+                  <a:extLst>
+                    <a:ext uri="{9D8B030D-6E8A-4147-A177-3AD203B41FA5}">
+                      <a16:colId xmlns:a16="http://schemas.microsoft.com/office/drawing/2014/main" val="1551037527"/>
+                    </a:ext>
+                  </a:extLst>
+                </a:gridCol>
+                <a:gridCol w="1565528">
+                  <a:extLst>
+                    <a:ext uri="{9D8B030D-6E8A-4147-A177-3AD203B41FA5}">
+                      <a16:colId xmlns:a16="http://schemas.microsoft.com/office/drawing/2014/main" val="2059852468"/>
+                    </a:ext>
+                  </a:extLst>
+                </a:gridCol>
+                <a:gridCol w="784616">
+                  <a:extLst>
+                    <a:ext uri="{9D8B030D-6E8A-4147-A177-3AD203B41FA5}">
+                      <a16:colId xmlns:a16="http://schemas.microsoft.com/office/drawing/2014/main" val="2782488916"/>
+                    </a:ext>
+                  </a:extLst>
+                </a:gridCol>
+              </a:tblGrid>
+              <a:tr h="328045">
+                <a:tc>
+                  <a:txBody>
+                    <a:bodyPr/>
+                    <a:lstStyle/>
+                    <a:p>
+                      <a:pPr algn="ctr" fontAlgn="ctr"/>
+                      <a:r>
+                        <a:rPr lang="en-US" sz="1600" b="1" u="none" strike="noStrike" dirty="0">
+                          <a:effectLst/>
+                        </a:rPr>
+                        <a:t>Education</a:t>
+                      </a:r>
+                      <a:endParaRPr lang="en-US" sz="1600" b="1" i="0" u="none" strike="noStrike" dirty="0">
+                        <a:solidFill>
+                          <a:srgbClr val="000000"/>
+                        </a:solidFill>
+                        <a:effectLst/>
+                        <a:latin typeface="Lucida Sans" panose="020B0602030504020204" pitchFamily="34" charset="0"/>
+                      </a:endParaRPr>
+                    </a:p>
+                  </a:txBody>
+                  <a:tcPr marL="9525" marR="9525" marT="9525" marB="0" anchor="ctr"/>
+                </a:tc>
+                <a:tc>
+                  <a:txBody>
+                    <a:bodyPr/>
+                    <a:lstStyle/>
+                    <a:p>
+                      <a:pPr algn="ctr" fontAlgn="ctr"/>
+                      <a:r>
+                        <a:rPr lang="en-US" sz="1600" b="1" u="none" strike="noStrike" dirty="0" err="1">
+                          <a:effectLst/>
+                        </a:rPr>
+                        <a:t>JobRole</a:t>
+                      </a:r>
+                      <a:endParaRPr lang="en-US" sz="1600" b="1" i="0" u="none" strike="noStrike" dirty="0">
+                        <a:solidFill>
+                          <a:srgbClr val="000000"/>
+                        </a:solidFill>
+                        <a:effectLst/>
+                        <a:latin typeface="Lucida Sans" panose="020B0602030504020204" pitchFamily="34" charset="0"/>
+                      </a:endParaRPr>
+                    </a:p>
+                  </a:txBody>
+                  <a:tcPr marL="9525" marR="9525" marT="9525" marB="0" anchor="ctr"/>
+                </a:tc>
+                <a:tc>
+                  <a:txBody>
+                    <a:bodyPr/>
+                    <a:lstStyle/>
+                    <a:p>
+                      <a:pPr algn="ctr" fontAlgn="ctr"/>
+                      <a:r>
+                        <a:rPr lang="en-US" sz="1600" b="1" u="none" strike="noStrike" dirty="0">
+                          <a:effectLst/>
+                        </a:rPr>
+                        <a:t>count</a:t>
+                      </a:r>
+                      <a:endParaRPr lang="en-US" sz="1600" b="1" i="0" u="none" strike="noStrike" dirty="0">
+                        <a:solidFill>
+                          <a:srgbClr val="000000"/>
+                        </a:solidFill>
+                        <a:effectLst/>
+                        <a:latin typeface="Lucida Sans" panose="020B0602030504020204" pitchFamily="34" charset="0"/>
+                      </a:endParaRPr>
+                    </a:p>
+                  </a:txBody>
+                  <a:tcPr marL="9525" marR="9525" marT="9525" marB="0" anchor="ctr"/>
+                </a:tc>
+                <a:extLst>
+                  <a:ext uri="{0D108BD9-81ED-4DB2-BD59-A6C34878D82A}">
+                    <a16:rowId xmlns:a16="http://schemas.microsoft.com/office/drawing/2014/main" val="1903907203"/>
+                  </a:ext>
+                </a:extLst>
+              </a:tr>
+              <a:tr h="385935">
+                <a:tc>
+                  <a:txBody>
+                    <a:bodyPr/>
+                    <a:lstStyle/>
+                    <a:p>
+                      <a:pPr algn="ctr" fontAlgn="ctr"/>
+                      <a:r>
+                        <a:rPr lang="en-US" sz="1600" u="none" strike="noStrike" dirty="0">
+                          <a:effectLst/>
+                        </a:rPr>
+                        <a:t>1</a:t>
+                      </a:r>
+                      <a:endParaRPr lang="en-US" sz="1600" b="0" i="0" u="none" strike="noStrike" dirty="0">
+                        <a:solidFill>
+                          <a:srgbClr val="000000"/>
+                        </a:solidFill>
+                        <a:effectLst/>
+                        <a:latin typeface="Lucida Sans" panose="020B0602030504020204" pitchFamily="34" charset="0"/>
+                      </a:endParaRPr>
+                    </a:p>
+                  </a:txBody>
+                  <a:tcPr marL="9525" marR="9525" marT="9525" marB="0" anchor="ctr"/>
+                </a:tc>
+                <a:tc>
+                  <a:txBody>
+                    <a:bodyPr/>
+                    <a:lstStyle/>
+                    <a:p>
+                      <a:pPr algn="ctr" fontAlgn="ctr"/>
+                      <a:r>
+                        <a:rPr lang="en-US" sz="1600" u="none" strike="noStrike" dirty="0">
+                          <a:effectLst/>
+                        </a:rPr>
+                        <a:t>Research Scientist</a:t>
+                      </a:r>
+                      <a:endParaRPr lang="en-US" sz="1600" b="0" i="0" u="none" strike="noStrike" dirty="0">
+                        <a:solidFill>
+                          <a:srgbClr val="000000"/>
+                        </a:solidFill>
+                        <a:effectLst/>
+                        <a:latin typeface="Lucida Sans" panose="020B0602030504020204" pitchFamily="34" charset="0"/>
+                      </a:endParaRPr>
+                    </a:p>
+                  </a:txBody>
+                  <a:tcPr marL="9525" marR="9525" marT="9525" marB="0" anchor="ctr"/>
+                </a:tc>
+                <a:tc>
+                  <a:txBody>
+                    <a:bodyPr/>
+                    <a:lstStyle/>
+                    <a:p>
+                      <a:pPr algn="ctr" fontAlgn="ctr"/>
+                      <a:r>
+                        <a:rPr lang="en-US" sz="1600" u="none" strike="noStrike">
+                          <a:effectLst/>
+                        </a:rPr>
+                        <a:t>16</a:t>
+                      </a:r>
+                      <a:endParaRPr lang="en-US" sz="1600" b="0" i="0" u="none" strike="noStrike">
+                        <a:solidFill>
+                          <a:srgbClr val="000000"/>
+                        </a:solidFill>
+                        <a:effectLst/>
+                        <a:latin typeface="Lucida Sans" panose="020B0602030504020204" pitchFamily="34" charset="0"/>
+                      </a:endParaRPr>
+                    </a:p>
+                  </a:txBody>
+                  <a:tcPr marL="9525" marR="9525" marT="9525" marB="0" anchor="ctr"/>
+                </a:tc>
+                <a:extLst>
+                  <a:ext uri="{0D108BD9-81ED-4DB2-BD59-A6C34878D82A}">
+                    <a16:rowId xmlns:a16="http://schemas.microsoft.com/office/drawing/2014/main" val="2286419214"/>
+                  </a:ext>
+                </a:extLst>
+              </a:tr>
+              <a:tr h="385935">
+                <a:tc>
+                  <a:txBody>
+                    <a:bodyPr/>
+                    <a:lstStyle/>
+                    <a:p>
+                      <a:pPr algn="ctr" fontAlgn="ctr"/>
+                      <a:r>
+                        <a:rPr lang="en-US" sz="1600" u="none" strike="noStrike" dirty="0">
+                          <a:effectLst/>
+                        </a:rPr>
+                        <a:t>2</a:t>
+                      </a:r>
+                      <a:endParaRPr lang="en-US" sz="1600" b="0" i="0" u="none" strike="noStrike" dirty="0">
+                        <a:solidFill>
+                          <a:srgbClr val="000000"/>
+                        </a:solidFill>
+                        <a:effectLst/>
+                        <a:latin typeface="Lucida Sans" panose="020B0602030504020204" pitchFamily="34" charset="0"/>
+                      </a:endParaRPr>
+                    </a:p>
+                  </a:txBody>
+                  <a:tcPr marL="9525" marR="9525" marT="9525" marB="0" anchor="ctr"/>
+                </a:tc>
+                <a:tc>
+                  <a:txBody>
+                    <a:bodyPr/>
+                    <a:lstStyle/>
+                    <a:p>
+                      <a:pPr algn="ctr" fontAlgn="ctr"/>
+                      <a:r>
+                        <a:rPr lang="en-US" sz="1600" u="none" strike="noStrike" dirty="0">
+                          <a:effectLst/>
+                        </a:rPr>
+                        <a:t>Research Scientist</a:t>
+                      </a:r>
+                      <a:endParaRPr lang="en-US" sz="1600" b="0" i="0" u="none" strike="noStrike" dirty="0">
+                        <a:solidFill>
+                          <a:srgbClr val="000000"/>
+                        </a:solidFill>
+                        <a:effectLst/>
+                        <a:latin typeface="Lucida Sans" panose="020B0602030504020204" pitchFamily="34" charset="0"/>
+                      </a:endParaRPr>
+                    </a:p>
+                  </a:txBody>
+                  <a:tcPr marL="9525" marR="9525" marT="9525" marB="0" anchor="ctr"/>
+                </a:tc>
+                <a:tc>
+                  <a:txBody>
+                    <a:bodyPr/>
+                    <a:lstStyle/>
+                    <a:p>
+                      <a:pPr algn="ctr" fontAlgn="ctr"/>
+                      <a:r>
+                        <a:rPr lang="en-US" sz="1600" u="none" strike="noStrike">
+                          <a:effectLst/>
+                        </a:rPr>
+                        <a:t>30</a:t>
+                      </a:r>
+                      <a:endParaRPr lang="en-US" sz="1600" b="0" i="0" u="none" strike="noStrike">
+                        <a:solidFill>
+                          <a:srgbClr val="000000"/>
+                        </a:solidFill>
+                        <a:effectLst/>
+                        <a:latin typeface="Lucida Sans" panose="020B0602030504020204" pitchFamily="34" charset="0"/>
+                      </a:endParaRPr>
+                    </a:p>
+                  </a:txBody>
+                  <a:tcPr marL="9525" marR="9525" marT="9525" marB="0" anchor="ctr"/>
+                </a:tc>
+                <a:extLst>
+                  <a:ext uri="{0D108BD9-81ED-4DB2-BD59-A6C34878D82A}">
+                    <a16:rowId xmlns:a16="http://schemas.microsoft.com/office/drawing/2014/main" val="2090037665"/>
+                  </a:ext>
+                </a:extLst>
+              </a:tr>
+              <a:tr h="385935">
+                <a:tc>
+                  <a:txBody>
+                    <a:bodyPr/>
+                    <a:lstStyle/>
+                    <a:p>
+                      <a:pPr algn="ctr" fontAlgn="ctr"/>
+                      <a:r>
+                        <a:rPr lang="en-US" sz="1600" u="none" strike="noStrike" dirty="0">
+                          <a:effectLst/>
+                        </a:rPr>
+                        <a:t>3</a:t>
+                      </a:r>
+                      <a:endParaRPr lang="en-US" sz="1600" b="0" i="0" u="none" strike="noStrike" dirty="0">
+                        <a:solidFill>
+                          <a:srgbClr val="000000"/>
+                        </a:solidFill>
+                        <a:effectLst/>
+                        <a:latin typeface="Lucida Sans" panose="020B0602030504020204" pitchFamily="34" charset="0"/>
+                      </a:endParaRPr>
+                    </a:p>
+                  </a:txBody>
+                  <a:tcPr marL="9525" marR="9525" marT="9525" marB="0" anchor="ctr"/>
+                </a:tc>
+                <a:tc>
+                  <a:txBody>
+                    <a:bodyPr/>
+                    <a:lstStyle/>
+                    <a:p>
+                      <a:pPr algn="ctr" fontAlgn="ctr"/>
+                      <a:r>
+                        <a:rPr lang="en-US" sz="1600" u="none" strike="noStrike" dirty="0">
+                          <a:effectLst/>
+                        </a:rPr>
+                        <a:t>Research Scientist</a:t>
+                      </a:r>
+                      <a:endParaRPr lang="en-US" sz="1600" b="0" i="0" u="none" strike="noStrike" dirty="0">
+                        <a:solidFill>
+                          <a:srgbClr val="000000"/>
+                        </a:solidFill>
+                        <a:effectLst/>
+                        <a:latin typeface="Lucida Sans" panose="020B0602030504020204" pitchFamily="34" charset="0"/>
+                      </a:endParaRPr>
+                    </a:p>
+                  </a:txBody>
+                  <a:tcPr marL="9525" marR="9525" marT="9525" marB="0" anchor="ctr"/>
+                </a:tc>
+                <a:tc>
+                  <a:txBody>
+                    <a:bodyPr/>
+                    <a:lstStyle/>
+                    <a:p>
+                      <a:pPr algn="ctr" fontAlgn="ctr"/>
+                      <a:r>
+                        <a:rPr lang="en-US" sz="1600" u="none" strike="noStrike">
+                          <a:effectLst/>
+                        </a:rPr>
+                        <a:t>78</a:t>
+                      </a:r>
+                      <a:endParaRPr lang="en-US" sz="1600" b="0" i="0" u="none" strike="noStrike">
+                        <a:solidFill>
+                          <a:srgbClr val="000000"/>
+                        </a:solidFill>
+                        <a:effectLst/>
+                        <a:latin typeface="Lucida Sans" panose="020B0602030504020204" pitchFamily="34" charset="0"/>
+                      </a:endParaRPr>
+                    </a:p>
+                  </a:txBody>
+                  <a:tcPr marL="9525" marR="9525" marT="9525" marB="0" anchor="ctr"/>
+                </a:tc>
+                <a:extLst>
+                  <a:ext uri="{0D108BD9-81ED-4DB2-BD59-A6C34878D82A}">
+                    <a16:rowId xmlns:a16="http://schemas.microsoft.com/office/drawing/2014/main" val="228377282"/>
+                  </a:ext>
+                </a:extLst>
+              </a:tr>
+              <a:tr h="385935">
+                <a:tc>
+                  <a:txBody>
+                    <a:bodyPr/>
+                    <a:lstStyle/>
+                    <a:p>
+                      <a:pPr algn="ctr" fontAlgn="ctr"/>
+                      <a:r>
+                        <a:rPr lang="en-US" sz="1600" u="none" strike="noStrike" dirty="0">
+                          <a:effectLst/>
+                        </a:rPr>
+                        <a:t>4</a:t>
+                      </a:r>
+                      <a:endParaRPr lang="en-US" sz="1600" b="0" i="0" u="none" strike="noStrike" dirty="0">
+                        <a:solidFill>
+                          <a:srgbClr val="000000"/>
+                        </a:solidFill>
+                        <a:effectLst/>
+                        <a:latin typeface="Lucida Sans" panose="020B0602030504020204" pitchFamily="34" charset="0"/>
+                      </a:endParaRPr>
+                    </a:p>
+                  </a:txBody>
+                  <a:tcPr marL="9525" marR="9525" marT="9525" marB="0" anchor="ctr"/>
+                </a:tc>
+                <a:tc>
+                  <a:txBody>
+                    <a:bodyPr/>
+                    <a:lstStyle/>
+                    <a:p>
+                      <a:pPr algn="ctr" fontAlgn="ctr"/>
+                      <a:r>
+                        <a:rPr lang="en-US" sz="1600" u="none" strike="noStrike" dirty="0">
+                          <a:effectLst/>
+                        </a:rPr>
+                        <a:t>Research Scientist</a:t>
+                      </a:r>
+                      <a:endParaRPr lang="en-US" sz="1600" b="0" i="0" u="none" strike="noStrike" dirty="0">
+                        <a:solidFill>
+                          <a:srgbClr val="000000"/>
+                        </a:solidFill>
+                        <a:effectLst/>
+                        <a:latin typeface="Lucida Sans" panose="020B0602030504020204" pitchFamily="34" charset="0"/>
+                      </a:endParaRPr>
+                    </a:p>
+                  </a:txBody>
+                  <a:tcPr marL="9525" marR="9525" marT="9525" marB="0" anchor="ctr"/>
+                </a:tc>
+                <a:tc>
+                  <a:txBody>
+                    <a:bodyPr/>
+                    <a:lstStyle/>
+                    <a:p>
+                      <a:pPr algn="ctr" fontAlgn="ctr"/>
+                      <a:r>
+                        <a:rPr lang="en-US" sz="1600" u="none" strike="noStrike" dirty="0">
+                          <a:effectLst/>
+                        </a:rPr>
+                        <a:t>44</a:t>
+                      </a:r>
+                      <a:endParaRPr lang="en-US" sz="1600" b="0" i="0" u="none" strike="noStrike" dirty="0">
+                        <a:solidFill>
+                          <a:srgbClr val="000000"/>
+                        </a:solidFill>
+                        <a:effectLst/>
+                        <a:latin typeface="Lucida Sans" panose="020B0602030504020204" pitchFamily="34" charset="0"/>
+                      </a:endParaRPr>
+                    </a:p>
+                  </a:txBody>
+                  <a:tcPr marL="9525" marR="9525" marT="9525" marB="0" anchor="ctr"/>
+                </a:tc>
+                <a:extLst>
+                  <a:ext uri="{0D108BD9-81ED-4DB2-BD59-A6C34878D82A}">
+                    <a16:rowId xmlns:a16="http://schemas.microsoft.com/office/drawing/2014/main" val="1655500338"/>
+                  </a:ext>
+                </a:extLst>
+              </a:tr>
+              <a:tr h="385935">
+                <a:tc>
+                  <a:txBody>
+                    <a:bodyPr/>
+                    <a:lstStyle/>
+                    <a:p>
+                      <a:pPr algn="ctr" fontAlgn="ctr"/>
+                      <a:r>
+                        <a:rPr lang="en-US" sz="1600" u="none" strike="noStrike">
+                          <a:effectLst/>
+                        </a:rPr>
+                        <a:t>5</a:t>
+                      </a:r>
+                      <a:endParaRPr lang="en-US" sz="1600" b="0" i="0" u="none" strike="noStrike">
+                        <a:solidFill>
+                          <a:srgbClr val="000000"/>
+                        </a:solidFill>
+                        <a:effectLst/>
+                        <a:latin typeface="Lucida Sans" panose="020B0602030504020204" pitchFamily="34" charset="0"/>
+                      </a:endParaRPr>
+                    </a:p>
+                  </a:txBody>
+                  <a:tcPr marL="9525" marR="9525" marT="9525" marB="0" anchor="ctr"/>
+                </a:tc>
+                <a:tc>
+                  <a:txBody>
+                    <a:bodyPr/>
+                    <a:lstStyle/>
+                    <a:p>
+                      <a:pPr algn="ctr" fontAlgn="ctr"/>
+                      <a:r>
+                        <a:rPr lang="en-US" sz="1600" u="none" strike="noStrike" dirty="0">
+                          <a:effectLst/>
+                        </a:rPr>
+                        <a:t>Research Scientist</a:t>
+                      </a:r>
+                      <a:endParaRPr lang="en-US" sz="1600" b="0" i="0" u="none" strike="noStrike" dirty="0">
+                        <a:solidFill>
+                          <a:srgbClr val="000000"/>
+                        </a:solidFill>
+                        <a:effectLst/>
+                        <a:latin typeface="Lucida Sans" panose="020B0602030504020204" pitchFamily="34" charset="0"/>
+                      </a:endParaRPr>
+                    </a:p>
+                  </a:txBody>
+                  <a:tcPr marL="9525" marR="9525" marT="9525" marB="0" anchor="ctr"/>
+                </a:tc>
+                <a:tc>
+                  <a:txBody>
+                    <a:bodyPr/>
+                    <a:lstStyle/>
+                    <a:p>
+                      <a:pPr algn="ctr" fontAlgn="ctr"/>
+                      <a:r>
+                        <a:rPr lang="en-US" sz="1600" u="none" strike="noStrike" dirty="0">
+                          <a:effectLst/>
+                        </a:rPr>
+                        <a:t>4</a:t>
+                      </a:r>
+                      <a:endParaRPr lang="en-US" sz="1600" b="0" i="0" u="none" strike="noStrike" dirty="0">
+                        <a:solidFill>
+                          <a:srgbClr val="000000"/>
+                        </a:solidFill>
+                        <a:effectLst/>
+                        <a:latin typeface="Lucida Sans" panose="020B0602030504020204" pitchFamily="34" charset="0"/>
+                      </a:endParaRPr>
+                    </a:p>
+                  </a:txBody>
+                  <a:tcPr marL="9525" marR="9525" marT="9525" marB="0" anchor="ctr"/>
+                </a:tc>
+                <a:extLst>
+                  <a:ext uri="{0D108BD9-81ED-4DB2-BD59-A6C34878D82A}">
+                    <a16:rowId xmlns:a16="http://schemas.microsoft.com/office/drawing/2014/main" val="1035775481"/>
+                  </a:ext>
+                </a:extLst>
+              </a:tr>
+            </a:tbl>
+          </a:graphicData>
+        </a:graphic>
+      </p:graphicFrame>
     </p:spTree>
     <p:extLst>
       <p:ext uri="{BB962C8B-B14F-4D97-AF65-F5344CB8AC3E}">
@@ -3609,11 +4124,1916 @@
         </p:blipFill>
         <p:spPr>
           <a:xfrm>
-            <a:off x="875781" y="146290"/>
-            <a:ext cx="10440438" cy="6711710"/>
+            <a:off x="5464365" y="1752750"/>
+            <a:ext cx="6488935" cy="5105250"/>
           </a:xfrm>
         </p:spPr>
       </p:pic>
+      <p:sp>
+        <p:nvSpPr>
+          <p:cNvPr id="2" name="TextBox 1">
+            <a:extLst>
+              <a:ext uri="{FF2B5EF4-FFF2-40B4-BE49-F238E27FC236}">
+                <a16:creationId xmlns:a16="http://schemas.microsoft.com/office/drawing/2014/main" id="{B1CF6835-FD44-44DB-9863-827016BAF68B}"/>
+              </a:ext>
+            </a:extLst>
+          </p:cNvPr>
+          <p:cNvSpPr txBox="1"/>
+          <p:nvPr/>
+        </p:nvSpPr>
+        <p:spPr>
+          <a:xfrm>
+            <a:off x="198304" y="275422"/>
+            <a:ext cx="7149947" cy="1200329"/>
+          </a:xfrm>
+          <a:prstGeom prst="rect">
+            <a:avLst/>
+          </a:prstGeom>
+          <a:noFill/>
+        </p:spPr>
+        <p:txBody>
+          <a:bodyPr wrap="square" rtlCol="0">
+            <a:spAutoFit/>
+          </a:bodyPr>
+          <a:lstStyle/>
+          <a:p>
+            <a:r>
+              <a:rPr lang="en-US" b="1" dirty="0"/>
+              <a:t>Points System</a:t>
+            </a:r>
+          </a:p>
+          <a:p>
+            <a:pPr marL="285750" indent="-285750">
+              <a:buFont typeface="Arial" panose="020B0604020202020204" pitchFamily="34" charset="0"/>
+              <a:buChar char="•"/>
+            </a:pPr>
+            <a:r>
+              <a:rPr lang="en-US" dirty="0"/>
+              <a:t>The top 20 factors are assigned Personal Points, or Business Points. </a:t>
+            </a:r>
+          </a:p>
+          <a:p>
+            <a:pPr marL="285750" indent="-285750">
+              <a:buFont typeface="Arial" panose="020B0604020202020204" pitchFamily="34" charset="0"/>
+              <a:buChar char="•"/>
+            </a:pPr>
+            <a:r>
+              <a:rPr lang="en-US" dirty="0"/>
+              <a:t>The points are given based on the count of 'Yes'. Factors with more counts of 'Yes' rank higher. </a:t>
+            </a:r>
+          </a:p>
+        </p:txBody>
+      </p:sp>
+      <p:graphicFrame>
+        <p:nvGraphicFramePr>
+          <p:cNvPr id="5" name="Table 4">
+            <a:extLst>
+              <a:ext uri="{FF2B5EF4-FFF2-40B4-BE49-F238E27FC236}">
+                <a16:creationId xmlns:a16="http://schemas.microsoft.com/office/drawing/2014/main" id="{D0C94CD6-333E-4D46-959F-8AC51B9F4E90}"/>
+              </a:ext>
+            </a:extLst>
+          </p:cNvPr>
+          <p:cNvGraphicFramePr>
+            <a:graphicFrameLocks noGrp="1"/>
+          </p:cNvGraphicFramePr>
+          <p:nvPr>
+            <p:extLst>
+              <p:ext uri="{D42A27DB-BD31-4B8C-83A1-F6EECF244321}">
+                <p14:modId xmlns:p14="http://schemas.microsoft.com/office/powerpoint/2010/main" val="1480479180"/>
+              </p:ext>
+            </p:extLst>
+          </p:nvPr>
+        </p:nvGraphicFramePr>
+        <p:xfrm>
+          <a:off x="585577" y="3773039"/>
+          <a:ext cx="4878788" cy="2558415"/>
+        </p:xfrm>
+        <a:graphic>
+          <a:graphicData uri="http://schemas.openxmlformats.org/drawingml/2006/table">
+            <a:tbl>
+              <a:tblPr>
+                <a:tableStyleId>{5C22544A-7EE6-4342-B048-85BDC9FD1C3A}</a:tableStyleId>
+              </a:tblPr>
+              <a:tblGrid>
+                <a:gridCol w="2487988">
+                  <a:extLst>
+                    <a:ext uri="{9D8B030D-6E8A-4147-A177-3AD203B41FA5}">
+                      <a16:colId xmlns:a16="http://schemas.microsoft.com/office/drawing/2014/main" val="3508751279"/>
+                    </a:ext>
+                  </a:extLst>
+                </a:gridCol>
+                <a:gridCol w="1457805">
+                  <a:extLst>
+                    <a:ext uri="{9D8B030D-6E8A-4147-A177-3AD203B41FA5}">
+                      <a16:colId xmlns:a16="http://schemas.microsoft.com/office/drawing/2014/main" val="3809517303"/>
+                    </a:ext>
+                  </a:extLst>
+                </a:gridCol>
+                <a:gridCol w="932995">
+                  <a:extLst>
+                    <a:ext uri="{9D8B030D-6E8A-4147-A177-3AD203B41FA5}">
+                      <a16:colId xmlns:a16="http://schemas.microsoft.com/office/drawing/2014/main" val="3891925955"/>
+                    </a:ext>
+                  </a:extLst>
+                </a:gridCol>
+              </a:tblGrid>
+              <a:tr h="190500">
+                <a:tc>
+                  <a:txBody>
+                    <a:bodyPr/>
+                    <a:lstStyle/>
+                    <a:p>
+                      <a:pPr algn="l" fontAlgn="b"/>
+                      <a:r>
+                        <a:rPr lang="en-US" sz="1100" b="1" u="none" strike="noStrike" dirty="0">
+                          <a:effectLst/>
+                        </a:rPr>
+                        <a:t>Business Points</a:t>
+                      </a:r>
+                    </a:p>
+                    <a:p>
+                      <a:pPr algn="l" fontAlgn="b"/>
+                      <a:r>
+                        <a:rPr lang="en-US" sz="1100" b="1" i="0" u="none" strike="noStrike" dirty="0">
+                          <a:solidFill>
+                            <a:srgbClr val="000000"/>
+                          </a:solidFill>
+                          <a:effectLst/>
+                          <a:latin typeface="Calibri" panose="020F0502020204030204" pitchFamily="34" charset="0"/>
+                        </a:rPr>
+                        <a:t>Reason</a:t>
+                      </a:r>
+                    </a:p>
+                  </a:txBody>
+                  <a:tcPr marL="9525" marR="9525" marT="9525" marB="0" anchor="b"/>
+                </a:tc>
+                <a:tc>
+                  <a:txBody>
+                    <a:bodyPr/>
+                    <a:lstStyle/>
+                    <a:p>
+                      <a:pPr algn="l" fontAlgn="b"/>
+                      <a:r>
+                        <a:rPr lang="en-US" sz="1100" b="1" i="0" u="none" strike="noStrike" dirty="0">
+                          <a:solidFill>
+                            <a:srgbClr val="000000"/>
+                          </a:solidFill>
+                          <a:effectLst/>
+                          <a:latin typeface="Calibri" panose="020F0502020204030204" pitchFamily="34" charset="0"/>
+                        </a:rPr>
+                        <a:t>Factor</a:t>
+                      </a:r>
+                    </a:p>
+                  </a:txBody>
+                  <a:tcPr marL="9525" marR="9525" marT="9525" marB="0" anchor="b"/>
+                </a:tc>
+                <a:tc>
+                  <a:txBody>
+                    <a:bodyPr/>
+                    <a:lstStyle/>
+                    <a:p>
+                      <a:pPr algn="l" fontAlgn="b"/>
+                      <a:r>
+                        <a:rPr lang="en-US" sz="1100" b="1" i="0" u="none" strike="noStrike" dirty="0">
+                          <a:solidFill>
+                            <a:srgbClr val="000000"/>
+                          </a:solidFill>
+                          <a:effectLst/>
+                          <a:latin typeface="Calibri" panose="020F0502020204030204" pitchFamily="34" charset="0"/>
+                        </a:rPr>
+                        <a:t>Num ‘Yes’</a:t>
+                      </a:r>
+                    </a:p>
+                  </a:txBody>
+                  <a:tcPr marL="9525" marR="9525" marT="9525" marB="0" anchor="b"/>
+                </a:tc>
+                <a:extLst>
+                  <a:ext uri="{0D108BD9-81ED-4DB2-BD59-A6C34878D82A}">
+                    <a16:rowId xmlns:a16="http://schemas.microsoft.com/office/drawing/2014/main" val="3378381075"/>
+                  </a:ext>
+                </a:extLst>
+              </a:tr>
+              <a:tr h="190500">
+                <a:tc>
+                  <a:txBody>
+                    <a:bodyPr/>
+                    <a:lstStyle/>
+                    <a:p>
+                      <a:pPr algn="l" fontAlgn="b"/>
+                      <a:r>
+                        <a:rPr lang="en-US" sz="1100" u="none" strike="noStrike">
+                          <a:effectLst/>
+                        </a:rPr>
+                        <a:t>PerformanceRating</a:t>
+                      </a:r>
+                      <a:endParaRPr lang="en-US" sz="1100" b="0" i="0" u="none" strike="noStrike">
+                        <a:solidFill>
+                          <a:srgbClr val="000000"/>
+                        </a:solidFill>
+                        <a:effectLst/>
+                        <a:latin typeface="Calibri" panose="020F0502020204030204" pitchFamily="34" charset="0"/>
+                      </a:endParaRPr>
+                    </a:p>
+                  </a:txBody>
+                  <a:tcPr marL="9525" marR="9525" marT="9525" marB="0" anchor="b"/>
+                </a:tc>
+                <a:tc>
+                  <a:txBody>
+                    <a:bodyPr/>
+                    <a:lstStyle/>
+                    <a:p>
+                      <a:pPr algn="l" fontAlgn="b"/>
+                      <a:r>
+                        <a:rPr lang="en-US" sz="1100" u="none" strike="noStrike" dirty="0">
+                          <a:effectLst/>
+                        </a:rPr>
+                        <a:t>3</a:t>
+                      </a:r>
+                      <a:endParaRPr lang="en-US" sz="1100" b="0" i="0" u="none" strike="noStrike" dirty="0">
+                        <a:solidFill>
+                          <a:srgbClr val="000000"/>
+                        </a:solidFill>
+                        <a:effectLst/>
+                        <a:latin typeface="Calibri" panose="020F0502020204030204" pitchFamily="34" charset="0"/>
+                      </a:endParaRPr>
+                    </a:p>
+                  </a:txBody>
+                  <a:tcPr marL="9525" marR="9525" marT="9525" marB="0" anchor="b"/>
+                </a:tc>
+                <a:tc>
+                  <a:txBody>
+                    <a:bodyPr/>
+                    <a:lstStyle/>
+                    <a:p>
+                      <a:pPr algn="l" fontAlgn="b"/>
+                      <a:r>
+                        <a:rPr lang="en-US" sz="1100" u="none" strike="noStrike">
+                          <a:effectLst/>
+                        </a:rPr>
+                        <a:t>117</a:t>
+                      </a:r>
+                      <a:endParaRPr lang="en-US" sz="1100" b="0" i="0" u="none" strike="noStrike">
+                        <a:solidFill>
+                          <a:srgbClr val="000000"/>
+                        </a:solidFill>
+                        <a:effectLst/>
+                        <a:latin typeface="Calibri" panose="020F0502020204030204" pitchFamily="34" charset="0"/>
+                      </a:endParaRPr>
+                    </a:p>
+                  </a:txBody>
+                  <a:tcPr marL="9525" marR="9525" marT="9525" marB="0" anchor="b"/>
+                </a:tc>
+                <a:extLst>
+                  <a:ext uri="{0D108BD9-81ED-4DB2-BD59-A6C34878D82A}">
+                    <a16:rowId xmlns:a16="http://schemas.microsoft.com/office/drawing/2014/main" val="692746186"/>
+                  </a:ext>
+                </a:extLst>
+              </a:tr>
+              <a:tr h="190500">
+                <a:tc>
+                  <a:txBody>
+                    <a:bodyPr/>
+                    <a:lstStyle/>
+                    <a:p>
+                      <a:pPr algn="l" fontAlgn="b"/>
+                      <a:r>
+                        <a:rPr lang="en-US" sz="1100" u="none" strike="noStrike">
+                          <a:effectLst/>
+                        </a:rPr>
+                        <a:t>StockOptionLevel </a:t>
+                      </a:r>
+                      <a:endParaRPr lang="en-US" sz="1100" b="0" i="0" u="none" strike="noStrike">
+                        <a:solidFill>
+                          <a:srgbClr val="000000"/>
+                        </a:solidFill>
+                        <a:effectLst/>
+                        <a:latin typeface="Calibri" panose="020F0502020204030204" pitchFamily="34" charset="0"/>
+                      </a:endParaRPr>
+                    </a:p>
+                  </a:txBody>
+                  <a:tcPr marL="9525" marR="9525" marT="9525" marB="0" anchor="b"/>
+                </a:tc>
+                <a:tc>
+                  <a:txBody>
+                    <a:bodyPr/>
+                    <a:lstStyle/>
+                    <a:p>
+                      <a:pPr algn="l" fontAlgn="b"/>
+                      <a:r>
+                        <a:rPr lang="en-US" sz="1100" u="none" strike="noStrike" dirty="0">
+                          <a:effectLst/>
+                        </a:rPr>
+                        <a:t>0</a:t>
+                      </a:r>
+                      <a:endParaRPr lang="en-US" sz="1100" b="0" i="0" u="none" strike="noStrike" dirty="0">
+                        <a:solidFill>
+                          <a:srgbClr val="000000"/>
+                        </a:solidFill>
+                        <a:effectLst/>
+                        <a:latin typeface="Calibri" panose="020F0502020204030204" pitchFamily="34" charset="0"/>
+                      </a:endParaRPr>
+                    </a:p>
+                  </a:txBody>
+                  <a:tcPr marL="9525" marR="9525" marT="9525" marB="0" anchor="b"/>
+                </a:tc>
+                <a:tc>
+                  <a:txBody>
+                    <a:bodyPr/>
+                    <a:lstStyle/>
+                    <a:p>
+                      <a:pPr algn="l" fontAlgn="b"/>
+                      <a:r>
+                        <a:rPr lang="en-US" sz="1100" u="none" strike="noStrike">
+                          <a:effectLst/>
+                        </a:rPr>
+                        <a:t>98</a:t>
+                      </a:r>
+                      <a:endParaRPr lang="en-US" sz="1100" b="0" i="0" u="none" strike="noStrike">
+                        <a:solidFill>
+                          <a:srgbClr val="000000"/>
+                        </a:solidFill>
+                        <a:effectLst/>
+                        <a:latin typeface="Calibri" panose="020F0502020204030204" pitchFamily="34" charset="0"/>
+                      </a:endParaRPr>
+                    </a:p>
+                  </a:txBody>
+                  <a:tcPr marL="9525" marR="9525" marT="9525" marB="0" anchor="b"/>
+                </a:tc>
+                <a:extLst>
+                  <a:ext uri="{0D108BD9-81ED-4DB2-BD59-A6C34878D82A}">
+                    <a16:rowId xmlns:a16="http://schemas.microsoft.com/office/drawing/2014/main" val="389180955"/>
+                  </a:ext>
+                </a:extLst>
+              </a:tr>
+              <a:tr h="190500">
+                <a:tc>
+                  <a:txBody>
+                    <a:bodyPr/>
+                    <a:lstStyle/>
+                    <a:p>
+                      <a:pPr algn="l" fontAlgn="b"/>
+                      <a:r>
+                        <a:rPr lang="en-US" sz="1100" u="none" strike="noStrike">
+                          <a:effectLst/>
+                        </a:rPr>
+                        <a:t>BusinessTravel </a:t>
+                      </a:r>
+                      <a:endParaRPr lang="en-US" sz="1100" b="0" i="0" u="none" strike="noStrike">
+                        <a:solidFill>
+                          <a:srgbClr val="000000"/>
+                        </a:solidFill>
+                        <a:effectLst/>
+                        <a:latin typeface="Calibri" panose="020F0502020204030204" pitchFamily="34" charset="0"/>
+                      </a:endParaRPr>
+                    </a:p>
+                  </a:txBody>
+                  <a:tcPr marL="9525" marR="9525" marT="9525" marB="0" anchor="b"/>
+                </a:tc>
+                <a:tc>
+                  <a:txBody>
+                    <a:bodyPr/>
+                    <a:lstStyle/>
+                    <a:p>
+                      <a:pPr algn="l" fontAlgn="b"/>
+                      <a:r>
+                        <a:rPr lang="en-US" sz="1100" u="none" strike="noStrike" dirty="0" err="1">
+                          <a:effectLst/>
+                        </a:rPr>
+                        <a:t>Travel_Rarely</a:t>
+                      </a:r>
+                      <a:endParaRPr lang="en-US" sz="1100" b="0" i="0" u="none" strike="noStrike" dirty="0">
+                        <a:solidFill>
+                          <a:srgbClr val="000000"/>
+                        </a:solidFill>
+                        <a:effectLst/>
+                        <a:latin typeface="Calibri" panose="020F0502020204030204" pitchFamily="34" charset="0"/>
+                      </a:endParaRPr>
+                    </a:p>
+                  </a:txBody>
+                  <a:tcPr marL="9525" marR="9525" marT="9525" marB="0" anchor="b"/>
+                </a:tc>
+                <a:tc>
+                  <a:txBody>
+                    <a:bodyPr/>
+                    <a:lstStyle/>
+                    <a:p>
+                      <a:pPr algn="l" fontAlgn="b"/>
+                      <a:r>
+                        <a:rPr lang="en-US" sz="1100" u="none" strike="noStrike">
+                          <a:effectLst/>
+                        </a:rPr>
+                        <a:t>94</a:t>
+                      </a:r>
+                      <a:endParaRPr lang="en-US" sz="1100" b="0" i="0" u="none" strike="noStrike">
+                        <a:solidFill>
+                          <a:srgbClr val="000000"/>
+                        </a:solidFill>
+                        <a:effectLst/>
+                        <a:latin typeface="Calibri" panose="020F0502020204030204" pitchFamily="34" charset="0"/>
+                      </a:endParaRPr>
+                    </a:p>
+                  </a:txBody>
+                  <a:tcPr marL="9525" marR="9525" marT="9525" marB="0" anchor="b"/>
+                </a:tc>
+                <a:extLst>
+                  <a:ext uri="{0D108BD9-81ED-4DB2-BD59-A6C34878D82A}">
+                    <a16:rowId xmlns:a16="http://schemas.microsoft.com/office/drawing/2014/main" val="1436857048"/>
+                  </a:ext>
+                </a:extLst>
+              </a:tr>
+              <a:tr h="190500">
+                <a:tc>
+                  <a:txBody>
+                    <a:bodyPr/>
+                    <a:lstStyle/>
+                    <a:p>
+                      <a:pPr algn="l" fontAlgn="b"/>
+                      <a:r>
+                        <a:rPr lang="en-US" sz="1100" u="none" strike="noStrike">
+                          <a:effectLst/>
+                        </a:rPr>
+                        <a:t>JobLevel </a:t>
+                      </a:r>
+                      <a:endParaRPr lang="en-US" sz="1100" b="0" i="0" u="none" strike="noStrike">
+                        <a:solidFill>
+                          <a:srgbClr val="000000"/>
+                        </a:solidFill>
+                        <a:effectLst/>
+                        <a:latin typeface="Calibri" panose="020F0502020204030204" pitchFamily="34" charset="0"/>
+                      </a:endParaRPr>
+                    </a:p>
+                  </a:txBody>
+                  <a:tcPr marL="9525" marR="9525" marT="9525" marB="0" anchor="b"/>
+                </a:tc>
+                <a:tc>
+                  <a:txBody>
+                    <a:bodyPr/>
+                    <a:lstStyle/>
+                    <a:p>
+                      <a:pPr algn="l" fontAlgn="b"/>
+                      <a:r>
+                        <a:rPr lang="en-US" sz="1100" u="none" strike="noStrike" dirty="0">
+                          <a:effectLst/>
+                        </a:rPr>
+                        <a:t>1</a:t>
+                      </a:r>
+                      <a:endParaRPr lang="en-US" sz="1100" b="0" i="0" u="none" strike="noStrike" dirty="0">
+                        <a:solidFill>
+                          <a:srgbClr val="000000"/>
+                        </a:solidFill>
+                        <a:effectLst/>
+                        <a:latin typeface="Calibri" panose="020F0502020204030204" pitchFamily="34" charset="0"/>
+                      </a:endParaRPr>
+                    </a:p>
+                  </a:txBody>
+                  <a:tcPr marL="9525" marR="9525" marT="9525" marB="0" anchor="b"/>
+                </a:tc>
+                <a:tc>
+                  <a:txBody>
+                    <a:bodyPr/>
+                    <a:lstStyle/>
+                    <a:p>
+                      <a:pPr algn="l" fontAlgn="b"/>
+                      <a:r>
+                        <a:rPr lang="en-US" sz="1100" u="none" strike="noStrike">
+                          <a:effectLst/>
+                        </a:rPr>
+                        <a:t>86</a:t>
+                      </a:r>
+                      <a:endParaRPr lang="en-US" sz="1100" b="0" i="0" u="none" strike="noStrike">
+                        <a:solidFill>
+                          <a:srgbClr val="000000"/>
+                        </a:solidFill>
+                        <a:effectLst/>
+                        <a:latin typeface="Calibri" panose="020F0502020204030204" pitchFamily="34" charset="0"/>
+                      </a:endParaRPr>
+                    </a:p>
+                  </a:txBody>
+                  <a:tcPr marL="9525" marR="9525" marT="9525" marB="0" anchor="b"/>
+                </a:tc>
+                <a:extLst>
+                  <a:ext uri="{0D108BD9-81ED-4DB2-BD59-A6C34878D82A}">
+                    <a16:rowId xmlns:a16="http://schemas.microsoft.com/office/drawing/2014/main" val="492759009"/>
+                  </a:ext>
+                </a:extLst>
+              </a:tr>
+              <a:tr h="190500">
+                <a:tc>
+                  <a:txBody>
+                    <a:bodyPr/>
+                    <a:lstStyle/>
+                    <a:p>
+                      <a:pPr algn="l" fontAlgn="b"/>
+                      <a:r>
+                        <a:rPr lang="en-US" sz="1100" u="none" strike="noStrike">
+                          <a:effectLst/>
+                        </a:rPr>
+                        <a:t>OverTime </a:t>
+                      </a:r>
+                      <a:endParaRPr lang="en-US" sz="1100" b="0" i="0" u="none" strike="noStrike">
+                        <a:solidFill>
+                          <a:srgbClr val="000000"/>
+                        </a:solidFill>
+                        <a:effectLst/>
+                        <a:latin typeface="Calibri" panose="020F0502020204030204" pitchFamily="34" charset="0"/>
+                      </a:endParaRPr>
+                    </a:p>
+                  </a:txBody>
+                  <a:tcPr marL="9525" marR="9525" marT="9525" marB="0" anchor="b"/>
+                </a:tc>
+                <a:tc>
+                  <a:txBody>
+                    <a:bodyPr/>
+                    <a:lstStyle/>
+                    <a:p>
+                      <a:pPr algn="l" fontAlgn="b"/>
+                      <a:r>
+                        <a:rPr lang="en-US" sz="1100" u="none" strike="noStrike" dirty="0">
+                          <a:effectLst/>
+                        </a:rPr>
+                        <a:t>Yes</a:t>
+                      </a:r>
+                      <a:endParaRPr lang="en-US" sz="1100" b="0" i="0" u="none" strike="noStrike" dirty="0">
+                        <a:solidFill>
+                          <a:srgbClr val="000000"/>
+                        </a:solidFill>
+                        <a:effectLst/>
+                        <a:latin typeface="Calibri" panose="020F0502020204030204" pitchFamily="34" charset="0"/>
+                      </a:endParaRPr>
+                    </a:p>
+                  </a:txBody>
+                  <a:tcPr marL="9525" marR="9525" marT="9525" marB="0" anchor="b"/>
+                </a:tc>
+                <a:tc>
+                  <a:txBody>
+                    <a:bodyPr/>
+                    <a:lstStyle/>
+                    <a:p>
+                      <a:pPr algn="l" fontAlgn="b"/>
+                      <a:r>
+                        <a:rPr lang="en-US" sz="1100" u="none" strike="noStrike">
+                          <a:effectLst/>
+                        </a:rPr>
+                        <a:t>80</a:t>
+                      </a:r>
+                      <a:endParaRPr lang="en-US" sz="1100" b="0" i="0" u="none" strike="noStrike">
+                        <a:solidFill>
+                          <a:srgbClr val="000000"/>
+                        </a:solidFill>
+                        <a:effectLst/>
+                        <a:latin typeface="Calibri" panose="020F0502020204030204" pitchFamily="34" charset="0"/>
+                      </a:endParaRPr>
+                    </a:p>
+                  </a:txBody>
+                  <a:tcPr marL="9525" marR="9525" marT="9525" marB="0" anchor="b"/>
+                </a:tc>
+                <a:extLst>
+                  <a:ext uri="{0D108BD9-81ED-4DB2-BD59-A6C34878D82A}">
+                    <a16:rowId xmlns:a16="http://schemas.microsoft.com/office/drawing/2014/main" val="4292225423"/>
+                  </a:ext>
+                </a:extLst>
+              </a:tr>
+              <a:tr h="190500">
+                <a:tc>
+                  <a:txBody>
+                    <a:bodyPr/>
+                    <a:lstStyle/>
+                    <a:p>
+                      <a:pPr algn="l" fontAlgn="b"/>
+                      <a:r>
+                        <a:rPr lang="en-US" sz="1100" u="none" strike="noStrike">
+                          <a:effectLst/>
+                        </a:rPr>
+                        <a:t>Department </a:t>
+                      </a:r>
+                      <a:endParaRPr lang="en-US" sz="1100" b="0" i="0" u="none" strike="noStrike">
+                        <a:solidFill>
+                          <a:srgbClr val="000000"/>
+                        </a:solidFill>
+                        <a:effectLst/>
+                        <a:latin typeface="Calibri" panose="020F0502020204030204" pitchFamily="34" charset="0"/>
+                      </a:endParaRPr>
+                    </a:p>
+                  </a:txBody>
+                  <a:tcPr marL="9525" marR="9525" marT="9525" marB="0" anchor="b"/>
+                </a:tc>
+                <a:tc>
+                  <a:txBody>
+                    <a:bodyPr/>
+                    <a:lstStyle/>
+                    <a:p>
+                      <a:pPr algn="l" fontAlgn="b"/>
+                      <a:r>
+                        <a:rPr lang="en-US" sz="1100" u="none" strike="noStrike" dirty="0">
+                          <a:effectLst/>
+                        </a:rPr>
+                        <a:t>Research &amp; Development </a:t>
+                      </a:r>
+                      <a:endParaRPr lang="en-US" sz="1100" b="0" i="0" u="none" strike="noStrike" dirty="0">
+                        <a:solidFill>
+                          <a:srgbClr val="000000"/>
+                        </a:solidFill>
+                        <a:effectLst/>
+                        <a:latin typeface="Calibri" panose="020F0502020204030204" pitchFamily="34" charset="0"/>
+                      </a:endParaRPr>
+                    </a:p>
+                  </a:txBody>
+                  <a:tcPr marL="9525" marR="9525" marT="9525" marB="0" anchor="b"/>
+                </a:tc>
+                <a:tc>
+                  <a:txBody>
+                    <a:bodyPr/>
+                    <a:lstStyle/>
+                    <a:p>
+                      <a:pPr algn="l" fontAlgn="b"/>
+                      <a:r>
+                        <a:rPr lang="en-US" sz="1100" u="none" strike="noStrike">
+                          <a:effectLst/>
+                        </a:rPr>
+                        <a:t>75</a:t>
+                      </a:r>
+                      <a:endParaRPr lang="en-US" sz="1100" b="0" i="0" u="none" strike="noStrike">
+                        <a:solidFill>
+                          <a:srgbClr val="000000"/>
+                        </a:solidFill>
+                        <a:effectLst/>
+                        <a:latin typeface="Calibri" panose="020F0502020204030204" pitchFamily="34" charset="0"/>
+                      </a:endParaRPr>
+                    </a:p>
+                  </a:txBody>
+                  <a:tcPr marL="9525" marR="9525" marT="9525" marB="0" anchor="b"/>
+                </a:tc>
+                <a:extLst>
+                  <a:ext uri="{0D108BD9-81ED-4DB2-BD59-A6C34878D82A}">
+                    <a16:rowId xmlns:a16="http://schemas.microsoft.com/office/drawing/2014/main" val="2505562838"/>
+                  </a:ext>
+                </a:extLst>
+              </a:tr>
+              <a:tr h="190500">
+                <a:tc>
+                  <a:txBody>
+                    <a:bodyPr/>
+                    <a:lstStyle/>
+                    <a:p>
+                      <a:pPr algn="l" fontAlgn="b"/>
+                      <a:r>
+                        <a:rPr lang="en-US" sz="1100" u="none" strike="noStrike">
+                          <a:effectLst/>
+                        </a:rPr>
+                        <a:t>JobInvolvement </a:t>
+                      </a:r>
+                      <a:endParaRPr lang="en-US" sz="1100" b="0" i="0" u="none" strike="noStrike">
+                        <a:solidFill>
+                          <a:srgbClr val="000000"/>
+                        </a:solidFill>
+                        <a:effectLst/>
+                        <a:latin typeface="Calibri" panose="020F0502020204030204" pitchFamily="34" charset="0"/>
+                      </a:endParaRPr>
+                    </a:p>
+                  </a:txBody>
+                  <a:tcPr marL="9525" marR="9525" marT="9525" marB="0" anchor="b"/>
+                </a:tc>
+                <a:tc>
+                  <a:txBody>
+                    <a:bodyPr/>
+                    <a:lstStyle/>
+                    <a:p>
+                      <a:pPr algn="l" fontAlgn="b"/>
+                      <a:r>
+                        <a:rPr lang="en-US" sz="1100" u="none" strike="noStrike" dirty="0">
+                          <a:effectLst/>
+                        </a:rPr>
+                        <a:t>3</a:t>
+                      </a:r>
+                      <a:endParaRPr lang="en-US" sz="1100" b="0" i="0" u="none" strike="noStrike" dirty="0">
+                        <a:solidFill>
+                          <a:srgbClr val="000000"/>
+                        </a:solidFill>
+                        <a:effectLst/>
+                        <a:latin typeface="Calibri" panose="020F0502020204030204" pitchFamily="34" charset="0"/>
+                      </a:endParaRPr>
+                    </a:p>
+                  </a:txBody>
+                  <a:tcPr marL="9525" marR="9525" marT="9525" marB="0" anchor="b"/>
+                </a:tc>
+                <a:tc>
+                  <a:txBody>
+                    <a:bodyPr/>
+                    <a:lstStyle/>
+                    <a:p>
+                      <a:pPr algn="l" fontAlgn="b"/>
+                      <a:r>
+                        <a:rPr lang="en-US" sz="1100" u="none" strike="noStrike">
+                          <a:effectLst/>
+                        </a:rPr>
+                        <a:t>67</a:t>
+                      </a:r>
+                      <a:endParaRPr lang="en-US" sz="1100" b="0" i="0" u="none" strike="noStrike">
+                        <a:solidFill>
+                          <a:srgbClr val="000000"/>
+                        </a:solidFill>
+                        <a:effectLst/>
+                        <a:latin typeface="Calibri" panose="020F0502020204030204" pitchFamily="34" charset="0"/>
+                      </a:endParaRPr>
+                    </a:p>
+                  </a:txBody>
+                  <a:tcPr marL="9525" marR="9525" marT="9525" marB="0" anchor="b"/>
+                </a:tc>
+                <a:extLst>
+                  <a:ext uri="{0D108BD9-81ED-4DB2-BD59-A6C34878D82A}">
+                    <a16:rowId xmlns:a16="http://schemas.microsoft.com/office/drawing/2014/main" val="615175296"/>
+                  </a:ext>
+                </a:extLst>
+              </a:tr>
+              <a:tr h="190500">
+                <a:tc>
+                  <a:txBody>
+                    <a:bodyPr/>
+                    <a:lstStyle/>
+                    <a:p>
+                      <a:pPr algn="l" fontAlgn="b"/>
+                      <a:r>
+                        <a:rPr lang="en-US" sz="1100" u="none" strike="noStrike">
+                          <a:effectLst/>
+                        </a:rPr>
+                        <a:t>YearsSinceLastPromotion </a:t>
+                      </a:r>
+                      <a:endParaRPr lang="en-US" sz="1100" b="0" i="0" u="none" strike="noStrike">
+                        <a:solidFill>
+                          <a:srgbClr val="000000"/>
+                        </a:solidFill>
+                        <a:effectLst/>
+                        <a:latin typeface="Calibri" panose="020F0502020204030204" pitchFamily="34" charset="0"/>
+                      </a:endParaRPr>
+                    </a:p>
+                  </a:txBody>
+                  <a:tcPr marL="9525" marR="9525" marT="9525" marB="0" anchor="b"/>
+                </a:tc>
+                <a:tc>
+                  <a:txBody>
+                    <a:bodyPr/>
+                    <a:lstStyle/>
+                    <a:p>
+                      <a:pPr algn="l" fontAlgn="b"/>
+                      <a:r>
+                        <a:rPr lang="en-US" sz="1100" u="none" strike="noStrike" dirty="0">
+                          <a:effectLst/>
+                        </a:rPr>
+                        <a:t>0</a:t>
+                      </a:r>
+                      <a:endParaRPr lang="en-US" sz="1100" b="0" i="0" u="none" strike="noStrike" dirty="0">
+                        <a:solidFill>
+                          <a:srgbClr val="000000"/>
+                        </a:solidFill>
+                        <a:effectLst/>
+                        <a:latin typeface="Calibri" panose="020F0502020204030204" pitchFamily="34" charset="0"/>
+                      </a:endParaRPr>
+                    </a:p>
+                  </a:txBody>
+                  <a:tcPr marL="9525" marR="9525" marT="9525" marB="0" anchor="b"/>
+                </a:tc>
+                <a:tc>
+                  <a:txBody>
+                    <a:bodyPr/>
+                    <a:lstStyle/>
+                    <a:p>
+                      <a:pPr algn="l" fontAlgn="b"/>
+                      <a:r>
+                        <a:rPr lang="en-US" sz="1100" u="none" strike="noStrike">
+                          <a:effectLst/>
+                        </a:rPr>
+                        <a:t>63</a:t>
+                      </a:r>
+                      <a:endParaRPr lang="en-US" sz="1100" b="0" i="0" u="none" strike="noStrike">
+                        <a:solidFill>
+                          <a:srgbClr val="000000"/>
+                        </a:solidFill>
+                        <a:effectLst/>
+                        <a:latin typeface="Calibri" panose="020F0502020204030204" pitchFamily="34" charset="0"/>
+                      </a:endParaRPr>
+                    </a:p>
+                  </a:txBody>
+                  <a:tcPr marL="9525" marR="9525" marT="9525" marB="0" anchor="b"/>
+                </a:tc>
+                <a:extLst>
+                  <a:ext uri="{0D108BD9-81ED-4DB2-BD59-A6C34878D82A}">
+                    <a16:rowId xmlns:a16="http://schemas.microsoft.com/office/drawing/2014/main" val="1829923324"/>
+                  </a:ext>
+                </a:extLst>
+              </a:tr>
+              <a:tr h="190500">
+                <a:tc>
+                  <a:txBody>
+                    <a:bodyPr/>
+                    <a:lstStyle/>
+                    <a:p>
+                      <a:pPr algn="l" fontAlgn="b"/>
+                      <a:r>
+                        <a:rPr lang="en-US" sz="1100" u="none" strike="noStrike">
+                          <a:effectLst/>
+                        </a:rPr>
+                        <a:t>TrainingTimesLastYear </a:t>
+                      </a:r>
+                      <a:endParaRPr lang="en-US" sz="1100" b="0" i="0" u="none" strike="noStrike">
+                        <a:solidFill>
+                          <a:srgbClr val="000000"/>
+                        </a:solidFill>
+                        <a:effectLst/>
+                        <a:latin typeface="Calibri" panose="020F0502020204030204" pitchFamily="34" charset="0"/>
+                      </a:endParaRPr>
+                    </a:p>
+                  </a:txBody>
+                  <a:tcPr marL="9525" marR="9525" marT="9525" marB="0" anchor="b"/>
+                </a:tc>
+                <a:tc>
+                  <a:txBody>
+                    <a:bodyPr/>
+                    <a:lstStyle/>
+                    <a:p>
+                      <a:pPr algn="l" fontAlgn="b"/>
+                      <a:r>
+                        <a:rPr lang="en-US" sz="1100" u="none" strike="noStrike" dirty="0">
+                          <a:effectLst/>
+                        </a:rPr>
+                        <a:t>2</a:t>
+                      </a:r>
+                      <a:endParaRPr lang="en-US" sz="1100" b="0" i="0" u="none" strike="noStrike" dirty="0">
+                        <a:solidFill>
+                          <a:srgbClr val="000000"/>
+                        </a:solidFill>
+                        <a:effectLst/>
+                        <a:latin typeface="Calibri" panose="020F0502020204030204" pitchFamily="34" charset="0"/>
+                      </a:endParaRPr>
+                    </a:p>
+                  </a:txBody>
+                  <a:tcPr marL="9525" marR="9525" marT="9525" marB="0" anchor="b"/>
+                </a:tc>
+                <a:tc>
+                  <a:txBody>
+                    <a:bodyPr/>
+                    <a:lstStyle/>
+                    <a:p>
+                      <a:pPr algn="l" fontAlgn="b"/>
+                      <a:r>
+                        <a:rPr lang="en-US" sz="1100" u="none" strike="noStrike">
+                          <a:effectLst/>
+                        </a:rPr>
+                        <a:t>57</a:t>
+                      </a:r>
+                      <a:endParaRPr lang="en-US" sz="1100" b="0" i="0" u="none" strike="noStrike">
+                        <a:solidFill>
+                          <a:srgbClr val="000000"/>
+                        </a:solidFill>
+                        <a:effectLst/>
+                        <a:latin typeface="Calibri" panose="020F0502020204030204" pitchFamily="34" charset="0"/>
+                      </a:endParaRPr>
+                    </a:p>
+                  </a:txBody>
+                  <a:tcPr marL="9525" marR="9525" marT="9525" marB="0" anchor="b"/>
+                </a:tc>
+                <a:extLst>
+                  <a:ext uri="{0D108BD9-81ED-4DB2-BD59-A6C34878D82A}">
+                    <a16:rowId xmlns:a16="http://schemas.microsoft.com/office/drawing/2014/main" val="1254314224"/>
+                  </a:ext>
+                </a:extLst>
+              </a:tr>
+              <a:tr h="190500">
+                <a:tc>
+                  <a:txBody>
+                    <a:bodyPr/>
+                    <a:lstStyle/>
+                    <a:p>
+                      <a:pPr algn="l" fontAlgn="b"/>
+                      <a:r>
+                        <a:rPr lang="en-US" sz="1100" u="none" strike="noStrike">
+                          <a:effectLst/>
+                        </a:rPr>
+                        <a:t>JobRole</a:t>
+                      </a:r>
+                      <a:endParaRPr lang="en-US" sz="1100" b="0" i="0" u="none" strike="noStrike">
+                        <a:solidFill>
+                          <a:srgbClr val="000000"/>
+                        </a:solidFill>
+                        <a:effectLst/>
+                        <a:latin typeface="Calibri" panose="020F0502020204030204" pitchFamily="34" charset="0"/>
+                      </a:endParaRPr>
+                    </a:p>
+                  </a:txBody>
+                  <a:tcPr marL="9525" marR="9525" marT="9525" marB="0" anchor="b"/>
+                </a:tc>
+                <a:tc>
+                  <a:txBody>
+                    <a:bodyPr/>
+                    <a:lstStyle/>
+                    <a:p>
+                      <a:pPr algn="l" fontAlgn="b"/>
+                      <a:r>
+                        <a:rPr lang="en-US" sz="1100" u="none" strike="noStrike" dirty="0">
+                          <a:effectLst/>
+                        </a:rPr>
+                        <a:t>Sales Executive or Research Scientist </a:t>
+                      </a:r>
+                      <a:endParaRPr lang="en-US" sz="1100" b="0" i="0" u="none" strike="noStrike" dirty="0">
+                        <a:solidFill>
+                          <a:srgbClr val="000000"/>
+                        </a:solidFill>
+                        <a:effectLst/>
+                        <a:latin typeface="Calibri" panose="020F0502020204030204" pitchFamily="34" charset="0"/>
+                      </a:endParaRPr>
+                    </a:p>
+                  </a:txBody>
+                  <a:tcPr marL="9525" marR="9525" marT="9525" marB="0" anchor="b"/>
+                </a:tc>
+                <a:tc>
+                  <a:txBody>
+                    <a:bodyPr/>
+                    <a:lstStyle/>
+                    <a:p>
+                      <a:pPr algn="l" fontAlgn="b"/>
+                      <a:r>
+                        <a:rPr lang="en-US" sz="1100" u="none" strike="noStrike" dirty="0">
+                          <a:effectLst/>
+                        </a:rPr>
+                        <a:t>33</a:t>
+                      </a:r>
+                      <a:endParaRPr lang="en-US" sz="1100" b="0" i="0" u="none" strike="noStrike" dirty="0">
+                        <a:solidFill>
+                          <a:srgbClr val="000000"/>
+                        </a:solidFill>
+                        <a:effectLst/>
+                        <a:latin typeface="Calibri" panose="020F0502020204030204" pitchFamily="34" charset="0"/>
+                      </a:endParaRPr>
+                    </a:p>
+                  </a:txBody>
+                  <a:tcPr marL="9525" marR="9525" marT="9525" marB="0" anchor="b"/>
+                </a:tc>
+                <a:extLst>
+                  <a:ext uri="{0D108BD9-81ED-4DB2-BD59-A6C34878D82A}">
+                    <a16:rowId xmlns:a16="http://schemas.microsoft.com/office/drawing/2014/main" val="131234696"/>
+                  </a:ext>
+                </a:extLst>
+              </a:tr>
+            </a:tbl>
+          </a:graphicData>
+        </a:graphic>
+      </p:graphicFrame>
+      <p:graphicFrame>
+        <p:nvGraphicFramePr>
+          <p:cNvPr id="12" name="Table 11">
+            <a:extLst>
+              <a:ext uri="{FF2B5EF4-FFF2-40B4-BE49-F238E27FC236}">
+                <a16:creationId xmlns:a16="http://schemas.microsoft.com/office/drawing/2014/main" id="{BD5BF415-4141-4584-8D2A-4D20C0DC8A04}"/>
+              </a:ext>
+            </a:extLst>
+          </p:cNvPr>
+          <p:cNvGraphicFramePr>
+            <a:graphicFrameLocks noGrp="1"/>
+          </p:cNvGraphicFramePr>
+          <p:nvPr>
+            <p:extLst>
+              <p:ext uri="{D42A27DB-BD31-4B8C-83A1-F6EECF244321}">
+                <p14:modId xmlns:p14="http://schemas.microsoft.com/office/powerpoint/2010/main" val="935754305"/>
+              </p:ext>
+            </p:extLst>
+          </p:nvPr>
+        </p:nvGraphicFramePr>
+        <p:xfrm>
+          <a:off x="585576" y="1487039"/>
+          <a:ext cx="4878789" cy="2286000"/>
+        </p:xfrm>
+        <a:graphic>
+          <a:graphicData uri="http://schemas.openxmlformats.org/drawingml/2006/table">
+            <a:tbl>
+              <a:tblPr>
+                <a:tableStyleId>{5C22544A-7EE6-4342-B048-85BDC9FD1C3A}</a:tableStyleId>
+              </a:tblPr>
+              <a:tblGrid>
+                <a:gridCol w="2546320">
+                  <a:extLst>
+                    <a:ext uri="{9D8B030D-6E8A-4147-A177-3AD203B41FA5}">
+                      <a16:colId xmlns:a16="http://schemas.microsoft.com/office/drawing/2014/main" val="1389930412"/>
+                    </a:ext>
+                  </a:extLst>
+                </a:gridCol>
+                <a:gridCol w="1332840">
+                  <a:extLst>
+                    <a:ext uri="{9D8B030D-6E8A-4147-A177-3AD203B41FA5}">
+                      <a16:colId xmlns:a16="http://schemas.microsoft.com/office/drawing/2014/main" val="2293338268"/>
+                    </a:ext>
+                  </a:extLst>
+                </a:gridCol>
+                <a:gridCol w="999629">
+                  <a:extLst>
+                    <a:ext uri="{9D8B030D-6E8A-4147-A177-3AD203B41FA5}">
+                      <a16:colId xmlns:a16="http://schemas.microsoft.com/office/drawing/2014/main" val="2339964452"/>
+                    </a:ext>
+                  </a:extLst>
+                </a:gridCol>
+              </a:tblGrid>
+              <a:tr h="190500">
+                <a:tc>
+                  <a:txBody>
+                    <a:bodyPr/>
+                    <a:lstStyle/>
+                    <a:p>
+                      <a:pPr algn="l" fontAlgn="b"/>
+                      <a:r>
+                        <a:rPr lang="en-US" sz="1100" b="1" u="none" strike="noStrike" dirty="0">
+                          <a:effectLst/>
+                        </a:rPr>
+                        <a:t>Personal Points</a:t>
+                      </a:r>
+                      <a:endParaRPr lang="en-US" sz="1100" b="1" i="0" u="none" strike="noStrike" dirty="0">
+                        <a:solidFill>
+                          <a:srgbClr val="000000"/>
+                        </a:solidFill>
+                        <a:effectLst/>
+                        <a:latin typeface="Calibri" panose="020F0502020204030204" pitchFamily="34" charset="0"/>
+                      </a:endParaRPr>
+                    </a:p>
+                  </a:txBody>
+                  <a:tcPr marL="9525" marR="9525" marT="9525" marB="0" anchor="b"/>
+                </a:tc>
+                <a:tc>
+                  <a:txBody>
+                    <a:bodyPr/>
+                    <a:lstStyle/>
+                    <a:p>
+                      <a:pPr algn="l" fontAlgn="b"/>
+                      <a:endParaRPr lang="en-US" sz="1100" b="1" i="0" u="none" strike="noStrike">
+                        <a:solidFill>
+                          <a:srgbClr val="000000"/>
+                        </a:solidFill>
+                        <a:effectLst/>
+                        <a:latin typeface="Calibri" panose="020F0502020204030204" pitchFamily="34" charset="0"/>
+                      </a:endParaRPr>
+                    </a:p>
+                  </a:txBody>
+                  <a:tcPr marL="9525" marR="9525" marT="9525" marB="0" anchor="b"/>
+                </a:tc>
+                <a:tc>
+                  <a:txBody>
+                    <a:bodyPr/>
+                    <a:lstStyle/>
+                    <a:p>
+                      <a:pPr algn="l" fontAlgn="b"/>
+                      <a:endParaRPr lang="en-US" sz="1100" b="1" i="0" u="none" strike="noStrike">
+                        <a:solidFill>
+                          <a:srgbClr val="000000"/>
+                        </a:solidFill>
+                        <a:effectLst/>
+                        <a:latin typeface="Calibri" panose="020F0502020204030204" pitchFamily="34" charset="0"/>
+                      </a:endParaRPr>
+                    </a:p>
+                  </a:txBody>
+                  <a:tcPr marL="9525" marR="9525" marT="9525" marB="0" anchor="b"/>
+                </a:tc>
+                <a:extLst>
+                  <a:ext uri="{0D108BD9-81ED-4DB2-BD59-A6C34878D82A}">
+                    <a16:rowId xmlns:a16="http://schemas.microsoft.com/office/drawing/2014/main" val="4091484317"/>
+                  </a:ext>
+                </a:extLst>
+              </a:tr>
+              <a:tr h="190500">
+                <a:tc>
+                  <a:txBody>
+                    <a:bodyPr/>
+                    <a:lstStyle/>
+                    <a:p>
+                      <a:pPr algn="l" fontAlgn="b"/>
+                      <a:r>
+                        <a:rPr lang="en-US" sz="1100" b="1" u="none" strike="noStrike" dirty="0">
+                          <a:effectLst/>
+                        </a:rPr>
+                        <a:t>Reason</a:t>
+                      </a:r>
+                      <a:endParaRPr lang="en-US" sz="1100" b="1" i="0" u="none" strike="noStrike" dirty="0">
+                        <a:solidFill>
+                          <a:srgbClr val="000000"/>
+                        </a:solidFill>
+                        <a:effectLst/>
+                        <a:latin typeface="Calibri" panose="020F0502020204030204" pitchFamily="34" charset="0"/>
+                      </a:endParaRPr>
+                    </a:p>
+                  </a:txBody>
+                  <a:tcPr marL="9525" marR="9525" marT="9525" marB="0" anchor="b"/>
+                </a:tc>
+                <a:tc>
+                  <a:txBody>
+                    <a:bodyPr/>
+                    <a:lstStyle/>
+                    <a:p>
+                      <a:pPr algn="l" fontAlgn="b"/>
+                      <a:r>
+                        <a:rPr lang="en-US" sz="1100" b="1" u="none" strike="noStrike" dirty="0">
+                          <a:effectLst/>
+                        </a:rPr>
+                        <a:t>Factor</a:t>
+                      </a:r>
+                      <a:endParaRPr lang="en-US" sz="1100" b="1" i="0" u="none" strike="noStrike" dirty="0">
+                        <a:solidFill>
+                          <a:srgbClr val="000000"/>
+                        </a:solidFill>
+                        <a:effectLst/>
+                        <a:latin typeface="Calibri" panose="020F0502020204030204" pitchFamily="34" charset="0"/>
+                      </a:endParaRPr>
+                    </a:p>
+                  </a:txBody>
+                  <a:tcPr marL="9525" marR="9525" marT="9525" marB="0" anchor="b"/>
+                </a:tc>
+                <a:tc>
+                  <a:txBody>
+                    <a:bodyPr/>
+                    <a:lstStyle/>
+                    <a:p>
+                      <a:pPr algn="l" fontAlgn="b"/>
+                      <a:r>
+                        <a:rPr lang="en-US" sz="1100" b="1" u="none" strike="noStrike" dirty="0">
+                          <a:effectLst/>
+                        </a:rPr>
+                        <a:t>Num 'Yes'</a:t>
+                      </a:r>
+                      <a:endParaRPr lang="en-US" sz="1100" b="1" i="0" u="none" strike="noStrike" dirty="0">
+                        <a:solidFill>
+                          <a:srgbClr val="000000"/>
+                        </a:solidFill>
+                        <a:effectLst/>
+                        <a:latin typeface="Calibri" panose="020F0502020204030204" pitchFamily="34" charset="0"/>
+                      </a:endParaRPr>
+                    </a:p>
+                  </a:txBody>
+                  <a:tcPr marL="9525" marR="9525" marT="9525" marB="0" anchor="b"/>
+                </a:tc>
+                <a:extLst>
+                  <a:ext uri="{0D108BD9-81ED-4DB2-BD59-A6C34878D82A}">
+                    <a16:rowId xmlns:a16="http://schemas.microsoft.com/office/drawing/2014/main" val="1117251508"/>
+                  </a:ext>
+                </a:extLst>
+              </a:tr>
+              <a:tr h="190500">
+                <a:tc>
+                  <a:txBody>
+                    <a:bodyPr/>
+                    <a:lstStyle/>
+                    <a:p>
+                      <a:pPr algn="l" fontAlgn="b"/>
+                      <a:r>
+                        <a:rPr lang="en-US" sz="1100" u="none" strike="noStrike">
+                          <a:effectLst/>
+                        </a:rPr>
+                        <a:t>Gender </a:t>
+                      </a:r>
+                      <a:endParaRPr lang="en-US" sz="1100" b="0" i="0" u="none" strike="noStrike">
+                        <a:solidFill>
+                          <a:srgbClr val="000000"/>
+                        </a:solidFill>
+                        <a:effectLst/>
+                        <a:latin typeface="Calibri" panose="020F0502020204030204" pitchFamily="34" charset="0"/>
+                      </a:endParaRPr>
+                    </a:p>
+                  </a:txBody>
+                  <a:tcPr marL="9525" marR="9525" marT="9525" marB="0" anchor="b"/>
+                </a:tc>
+                <a:tc>
+                  <a:txBody>
+                    <a:bodyPr/>
+                    <a:lstStyle/>
+                    <a:p>
+                      <a:pPr algn="l" fontAlgn="b"/>
+                      <a:r>
+                        <a:rPr lang="en-US" sz="1100" u="none" strike="noStrike" dirty="0">
+                          <a:effectLst/>
+                        </a:rPr>
+                        <a:t> Male</a:t>
+                      </a:r>
+                      <a:endParaRPr lang="en-US" sz="1100" b="0" i="0" u="none" strike="noStrike" dirty="0">
+                        <a:solidFill>
+                          <a:srgbClr val="000000"/>
+                        </a:solidFill>
+                        <a:effectLst/>
+                        <a:latin typeface="Calibri" panose="020F0502020204030204" pitchFamily="34" charset="0"/>
+                      </a:endParaRPr>
+                    </a:p>
+                  </a:txBody>
+                  <a:tcPr marL="9525" marR="9525" marT="9525" marB="0" anchor="b"/>
+                </a:tc>
+                <a:tc>
+                  <a:txBody>
+                    <a:bodyPr/>
+                    <a:lstStyle/>
+                    <a:p>
+                      <a:pPr algn="l" fontAlgn="b"/>
+                      <a:r>
+                        <a:rPr lang="en-US" sz="1100" u="none" strike="noStrike">
+                          <a:effectLst/>
+                        </a:rPr>
+                        <a:t>87</a:t>
+                      </a:r>
+                      <a:endParaRPr lang="en-US" sz="1100" b="0" i="0" u="none" strike="noStrike">
+                        <a:solidFill>
+                          <a:srgbClr val="000000"/>
+                        </a:solidFill>
+                        <a:effectLst/>
+                        <a:latin typeface="Calibri" panose="020F0502020204030204" pitchFamily="34" charset="0"/>
+                      </a:endParaRPr>
+                    </a:p>
+                  </a:txBody>
+                  <a:tcPr marL="9525" marR="9525" marT="9525" marB="0" anchor="b"/>
+                </a:tc>
+                <a:extLst>
+                  <a:ext uri="{0D108BD9-81ED-4DB2-BD59-A6C34878D82A}">
+                    <a16:rowId xmlns:a16="http://schemas.microsoft.com/office/drawing/2014/main" val="1885417499"/>
+                  </a:ext>
+                </a:extLst>
+              </a:tr>
+              <a:tr h="190500">
+                <a:tc>
+                  <a:txBody>
+                    <a:bodyPr/>
+                    <a:lstStyle/>
+                    <a:p>
+                      <a:pPr algn="l" fontAlgn="b"/>
+                      <a:r>
+                        <a:rPr lang="en-US" sz="1100" u="none" strike="noStrike">
+                          <a:effectLst/>
+                        </a:rPr>
+                        <a:t>WorkLifeBalance |</a:t>
+                      </a:r>
+                      <a:endParaRPr lang="en-US" sz="1100" b="0" i="0" u="none" strike="noStrike">
+                        <a:solidFill>
+                          <a:srgbClr val="000000"/>
+                        </a:solidFill>
+                        <a:effectLst/>
+                        <a:latin typeface="Calibri" panose="020F0502020204030204" pitchFamily="34" charset="0"/>
+                      </a:endParaRPr>
+                    </a:p>
+                  </a:txBody>
+                  <a:tcPr marL="9525" marR="9525" marT="9525" marB="0" anchor="b"/>
+                </a:tc>
+                <a:tc>
+                  <a:txBody>
+                    <a:bodyPr/>
+                    <a:lstStyle/>
+                    <a:p>
+                      <a:pPr algn="l" fontAlgn="b"/>
+                      <a:r>
+                        <a:rPr lang="en-US" sz="1100" u="none" strike="noStrike" dirty="0">
+                          <a:effectLst/>
+                        </a:rPr>
+                        <a:t>3</a:t>
+                      </a:r>
+                      <a:endParaRPr lang="en-US" sz="1100" b="0" i="0" u="none" strike="noStrike" dirty="0">
+                        <a:solidFill>
+                          <a:srgbClr val="000000"/>
+                        </a:solidFill>
+                        <a:effectLst/>
+                        <a:latin typeface="Calibri" panose="020F0502020204030204" pitchFamily="34" charset="0"/>
+                      </a:endParaRPr>
+                    </a:p>
+                  </a:txBody>
+                  <a:tcPr marL="9525" marR="9525" marT="9525" marB="0" anchor="b"/>
+                </a:tc>
+                <a:tc>
+                  <a:txBody>
+                    <a:bodyPr/>
+                    <a:lstStyle/>
+                    <a:p>
+                      <a:pPr algn="l" fontAlgn="b"/>
+                      <a:r>
+                        <a:rPr lang="en-US" sz="1100" u="none" strike="noStrike">
+                          <a:effectLst/>
+                        </a:rPr>
+                        <a:t>80</a:t>
+                      </a:r>
+                      <a:endParaRPr lang="en-US" sz="1100" b="0" i="0" u="none" strike="noStrike">
+                        <a:solidFill>
+                          <a:srgbClr val="000000"/>
+                        </a:solidFill>
+                        <a:effectLst/>
+                        <a:latin typeface="Calibri" panose="020F0502020204030204" pitchFamily="34" charset="0"/>
+                      </a:endParaRPr>
+                    </a:p>
+                  </a:txBody>
+                  <a:tcPr marL="9525" marR="9525" marT="9525" marB="0" anchor="b"/>
+                </a:tc>
+                <a:extLst>
+                  <a:ext uri="{0D108BD9-81ED-4DB2-BD59-A6C34878D82A}">
+                    <a16:rowId xmlns:a16="http://schemas.microsoft.com/office/drawing/2014/main" val="2801790446"/>
+                  </a:ext>
+                </a:extLst>
+              </a:tr>
+              <a:tr h="190500">
+                <a:tc>
+                  <a:txBody>
+                    <a:bodyPr/>
+                    <a:lstStyle/>
+                    <a:p>
+                      <a:pPr algn="l" fontAlgn="b"/>
+                      <a:r>
+                        <a:rPr lang="en-US" sz="1100" u="none" strike="noStrike">
+                          <a:effectLst/>
+                        </a:rPr>
+                        <a:t>MaritalStatus</a:t>
+                      </a:r>
+                      <a:endParaRPr lang="en-US" sz="1100" b="0" i="0" u="none" strike="noStrike">
+                        <a:solidFill>
+                          <a:srgbClr val="000000"/>
+                        </a:solidFill>
+                        <a:effectLst/>
+                        <a:latin typeface="Calibri" panose="020F0502020204030204" pitchFamily="34" charset="0"/>
+                      </a:endParaRPr>
+                    </a:p>
+                  </a:txBody>
+                  <a:tcPr marL="9525" marR="9525" marT="9525" marB="0" anchor="b"/>
+                </a:tc>
+                <a:tc>
+                  <a:txBody>
+                    <a:bodyPr/>
+                    <a:lstStyle/>
+                    <a:p>
+                      <a:pPr algn="l" fontAlgn="b"/>
+                      <a:r>
+                        <a:rPr lang="en-US" sz="1100" u="none" strike="noStrike" dirty="0">
+                          <a:effectLst/>
+                        </a:rPr>
+                        <a:t>Single</a:t>
+                      </a:r>
+                      <a:endParaRPr lang="en-US" sz="1100" b="0" i="0" u="none" strike="noStrike" dirty="0">
+                        <a:solidFill>
+                          <a:srgbClr val="000000"/>
+                        </a:solidFill>
+                        <a:effectLst/>
+                        <a:latin typeface="Calibri" panose="020F0502020204030204" pitchFamily="34" charset="0"/>
+                      </a:endParaRPr>
+                    </a:p>
+                  </a:txBody>
+                  <a:tcPr marL="9525" marR="9525" marT="9525" marB="0" anchor="b"/>
+                </a:tc>
+                <a:tc>
+                  <a:txBody>
+                    <a:bodyPr/>
+                    <a:lstStyle/>
+                    <a:p>
+                      <a:pPr algn="l" fontAlgn="b"/>
+                      <a:r>
+                        <a:rPr lang="en-US" sz="1100" u="none" strike="noStrike">
+                          <a:effectLst/>
+                        </a:rPr>
+                        <a:t>70</a:t>
+                      </a:r>
+                      <a:endParaRPr lang="en-US" sz="1100" b="0" i="0" u="none" strike="noStrike">
+                        <a:solidFill>
+                          <a:srgbClr val="000000"/>
+                        </a:solidFill>
+                        <a:effectLst/>
+                        <a:latin typeface="Calibri" panose="020F0502020204030204" pitchFamily="34" charset="0"/>
+                      </a:endParaRPr>
+                    </a:p>
+                  </a:txBody>
+                  <a:tcPr marL="9525" marR="9525" marT="9525" marB="0" anchor="b"/>
+                </a:tc>
+                <a:extLst>
+                  <a:ext uri="{0D108BD9-81ED-4DB2-BD59-A6C34878D82A}">
+                    <a16:rowId xmlns:a16="http://schemas.microsoft.com/office/drawing/2014/main" val="4264363338"/>
+                  </a:ext>
+                </a:extLst>
+              </a:tr>
+              <a:tr h="190500">
+                <a:tc>
+                  <a:txBody>
+                    <a:bodyPr/>
+                    <a:lstStyle/>
+                    <a:p>
+                      <a:pPr algn="l" fontAlgn="b"/>
+                      <a:r>
+                        <a:rPr lang="en-US" sz="1100" u="none" strike="noStrike">
+                          <a:effectLst/>
+                        </a:rPr>
+                        <a:t>NumCompaniesWorked</a:t>
+                      </a:r>
+                      <a:endParaRPr lang="en-US" sz="1100" b="0" i="0" u="none" strike="noStrike">
+                        <a:solidFill>
+                          <a:srgbClr val="000000"/>
+                        </a:solidFill>
+                        <a:effectLst/>
+                        <a:latin typeface="Calibri" panose="020F0502020204030204" pitchFamily="34" charset="0"/>
+                      </a:endParaRPr>
+                    </a:p>
+                  </a:txBody>
+                  <a:tcPr marL="9525" marR="9525" marT="9525" marB="0" anchor="b"/>
+                </a:tc>
+                <a:tc>
+                  <a:txBody>
+                    <a:bodyPr/>
+                    <a:lstStyle/>
+                    <a:p>
+                      <a:pPr algn="l" fontAlgn="b"/>
+                      <a:r>
+                        <a:rPr lang="en-US" sz="1100" u="none" strike="noStrike" dirty="0">
+                          <a:effectLst/>
+                        </a:rPr>
+                        <a:t>1</a:t>
+                      </a:r>
+                      <a:endParaRPr lang="en-US" sz="1100" b="0" i="0" u="none" strike="noStrike" dirty="0">
+                        <a:solidFill>
+                          <a:srgbClr val="000000"/>
+                        </a:solidFill>
+                        <a:effectLst/>
+                        <a:latin typeface="Calibri" panose="020F0502020204030204" pitchFamily="34" charset="0"/>
+                      </a:endParaRPr>
+                    </a:p>
+                  </a:txBody>
+                  <a:tcPr marL="9525" marR="9525" marT="9525" marB="0" anchor="b"/>
+                </a:tc>
+                <a:tc>
+                  <a:txBody>
+                    <a:bodyPr/>
+                    <a:lstStyle/>
+                    <a:p>
+                      <a:pPr algn="l" fontAlgn="b"/>
+                      <a:r>
+                        <a:rPr lang="en-US" sz="1100" u="none" strike="noStrike" dirty="0">
+                          <a:effectLst/>
+                        </a:rPr>
+                        <a:t>60</a:t>
+                      </a:r>
+                      <a:endParaRPr lang="en-US" sz="1100" b="0" i="0" u="none" strike="noStrike" dirty="0">
+                        <a:solidFill>
+                          <a:srgbClr val="000000"/>
+                        </a:solidFill>
+                        <a:effectLst/>
+                        <a:latin typeface="Calibri" panose="020F0502020204030204" pitchFamily="34" charset="0"/>
+                      </a:endParaRPr>
+                    </a:p>
+                  </a:txBody>
+                  <a:tcPr marL="9525" marR="9525" marT="9525" marB="0" anchor="b"/>
+                </a:tc>
+                <a:extLst>
+                  <a:ext uri="{0D108BD9-81ED-4DB2-BD59-A6C34878D82A}">
+                    <a16:rowId xmlns:a16="http://schemas.microsoft.com/office/drawing/2014/main" val="2092715184"/>
+                  </a:ext>
+                </a:extLst>
+              </a:tr>
+              <a:tr h="190500">
+                <a:tc>
+                  <a:txBody>
+                    <a:bodyPr/>
+                    <a:lstStyle/>
+                    <a:p>
+                      <a:pPr algn="l" fontAlgn="b"/>
+                      <a:r>
+                        <a:rPr lang="en-US" sz="1100" u="none" strike="noStrike">
+                          <a:effectLst/>
+                        </a:rPr>
+                        <a:t>Education</a:t>
+                      </a:r>
+                      <a:endParaRPr lang="en-US" sz="1100" b="0" i="0" u="none" strike="noStrike">
+                        <a:solidFill>
+                          <a:srgbClr val="000000"/>
+                        </a:solidFill>
+                        <a:effectLst/>
+                        <a:latin typeface="Calibri" panose="020F0502020204030204" pitchFamily="34" charset="0"/>
+                      </a:endParaRPr>
+                    </a:p>
+                  </a:txBody>
+                  <a:tcPr marL="9525" marR="9525" marT="9525" marB="0" anchor="b"/>
+                </a:tc>
+                <a:tc>
+                  <a:txBody>
+                    <a:bodyPr/>
+                    <a:lstStyle/>
+                    <a:p>
+                      <a:pPr algn="l" fontAlgn="b"/>
+                      <a:r>
+                        <a:rPr lang="en-US" sz="1100" u="none" strike="noStrike">
+                          <a:effectLst/>
+                        </a:rPr>
+                        <a:t>3</a:t>
+                      </a:r>
+                      <a:endParaRPr lang="en-US" sz="1100" b="0" i="0" u="none" strike="noStrike">
+                        <a:solidFill>
+                          <a:srgbClr val="000000"/>
+                        </a:solidFill>
+                        <a:effectLst/>
+                        <a:latin typeface="Calibri" panose="020F0502020204030204" pitchFamily="34" charset="0"/>
+                      </a:endParaRPr>
+                    </a:p>
+                  </a:txBody>
+                  <a:tcPr marL="9525" marR="9525" marT="9525" marB="0" anchor="b"/>
+                </a:tc>
+                <a:tc>
+                  <a:txBody>
+                    <a:bodyPr/>
+                    <a:lstStyle/>
+                    <a:p>
+                      <a:pPr algn="l" fontAlgn="b"/>
+                      <a:r>
+                        <a:rPr lang="en-US" sz="1100" u="none" strike="noStrike" dirty="0">
+                          <a:effectLst/>
+                        </a:rPr>
+                        <a:t>55</a:t>
+                      </a:r>
+                      <a:endParaRPr lang="en-US" sz="1100" b="0" i="0" u="none" strike="noStrike" dirty="0">
+                        <a:solidFill>
+                          <a:srgbClr val="000000"/>
+                        </a:solidFill>
+                        <a:effectLst/>
+                        <a:latin typeface="Calibri" panose="020F0502020204030204" pitchFamily="34" charset="0"/>
+                      </a:endParaRPr>
+                    </a:p>
+                  </a:txBody>
+                  <a:tcPr marL="9525" marR="9525" marT="9525" marB="0" anchor="b"/>
+                </a:tc>
+                <a:extLst>
+                  <a:ext uri="{0D108BD9-81ED-4DB2-BD59-A6C34878D82A}">
+                    <a16:rowId xmlns:a16="http://schemas.microsoft.com/office/drawing/2014/main" val="2751844471"/>
+                  </a:ext>
+                </a:extLst>
+              </a:tr>
+              <a:tr h="190500">
+                <a:tc>
+                  <a:txBody>
+                    <a:bodyPr/>
+                    <a:lstStyle/>
+                    <a:p>
+                      <a:pPr algn="l" fontAlgn="b"/>
+                      <a:r>
+                        <a:rPr lang="en-US" sz="1100" u="none" strike="noStrike">
+                          <a:effectLst/>
+                        </a:rPr>
+                        <a:t>EducationField </a:t>
+                      </a:r>
+                      <a:endParaRPr lang="en-US" sz="1100" b="0" i="0" u="none" strike="noStrike">
+                        <a:solidFill>
+                          <a:srgbClr val="000000"/>
+                        </a:solidFill>
+                        <a:effectLst/>
+                        <a:latin typeface="Calibri" panose="020F0502020204030204" pitchFamily="34" charset="0"/>
+                      </a:endParaRPr>
+                    </a:p>
+                  </a:txBody>
+                  <a:tcPr marL="9525" marR="9525" marT="9525" marB="0" anchor="b"/>
+                </a:tc>
+                <a:tc>
+                  <a:txBody>
+                    <a:bodyPr/>
+                    <a:lstStyle/>
+                    <a:p>
+                      <a:pPr algn="l" fontAlgn="b"/>
+                      <a:r>
+                        <a:rPr lang="en-US" sz="1100" u="none" strike="noStrike" dirty="0">
+                          <a:effectLst/>
+                        </a:rPr>
+                        <a:t> Life Sciences</a:t>
+                      </a:r>
+                      <a:endParaRPr lang="en-US" sz="1100" b="0" i="0" u="none" strike="noStrike" dirty="0">
+                        <a:solidFill>
+                          <a:srgbClr val="000000"/>
+                        </a:solidFill>
+                        <a:effectLst/>
+                        <a:latin typeface="Calibri" panose="020F0502020204030204" pitchFamily="34" charset="0"/>
+                      </a:endParaRPr>
+                    </a:p>
+                  </a:txBody>
+                  <a:tcPr marL="9525" marR="9525" marT="9525" marB="0" anchor="b"/>
+                </a:tc>
+                <a:tc>
+                  <a:txBody>
+                    <a:bodyPr/>
+                    <a:lstStyle/>
+                    <a:p>
+                      <a:pPr algn="l" fontAlgn="b"/>
+                      <a:r>
+                        <a:rPr lang="en-US" sz="1100" u="none" strike="noStrike" dirty="0">
+                          <a:effectLst/>
+                        </a:rPr>
+                        <a:t>53</a:t>
+                      </a:r>
+                      <a:endParaRPr lang="en-US" sz="1100" b="0" i="0" u="none" strike="noStrike" dirty="0">
+                        <a:solidFill>
+                          <a:srgbClr val="000000"/>
+                        </a:solidFill>
+                        <a:effectLst/>
+                        <a:latin typeface="Calibri" panose="020F0502020204030204" pitchFamily="34" charset="0"/>
+                      </a:endParaRPr>
+                    </a:p>
+                  </a:txBody>
+                  <a:tcPr marL="9525" marR="9525" marT="9525" marB="0" anchor="b"/>
+                </a:tc>
+                <a:extLst>
+                  <a:ext uri="{0D108BD9-81ED-4DB2-BD59-A6C34878D82A}">
+                    <a16:rowId xmlns:a16="http://schemas.microsoft.com/office/drawing/2014/main" val="4175854849"/>
+                  </a:ext>
+                </a:extLst>
+              </a:tr>
+              <a:tr h="190500">
+                <a:tc>
+                  <a:txBody>
+                    <a:bodyPr/>
+                    <a:lstStyle/>
+                    <a:p>
+                      <a:pPr algn="l" fontAlgn="b"/>
+                      <a:r>
+                        <a:rPr lang="en-US" sz="1100" u="none" strike="noStrike">
+                          <a:effectLst/>
+                        </a:rPr>
+                        <a:t>EnvironmentSatisfaction</a:t>
+                      </a:r>
+                      <a:endParaRPr lang="en-US" sz="1100" b="0" i="0" u="none" strike="noStrike">
+                        <a:solidFill>
+                          <a:srgbClr val="000000"/>
+                        </a:solidFill>
+                        <a:effectLst/>
+                        <a:latin typeface="Calibri" panose="020F0502020204030204" pitchFamily="34" charset="0"/>
+                      </a:endParaRPr>
+                    </a:p>
+                  </a:txBody>
+                  <a:tcPr marL="9525" marR="9525" marT="9525" marB="0" anchor="b"/>
+                </a:tc>
+                <a:tc>
+                  <a:txBody>
+                    <a:bodyPr/>
+                    <a:lstStyle/>
+                    <a:p>
+                      <a:pPr algn="l" fontAlgn="b"/>
+                      <a:r>
+                        <a:rPr lang="en-US" sz="1100" u="none" strike="noStrike">
+                          <a:effectLst/>
+                        </a:rPr>
+                        <a:t>1</a:t>
+                      </a:r>
+                      <a:endParaRPr lang="en-US" sz="1100" b="0" i="0" u="none" strike="noStrike">
+                        <a:solidFill>
+                          <a:srgbClr val="000000"/>
+                        </a:solidFill>
+                        <a:effectLst/>
+                        <a:latin typeface="Calibri" panose="020F0502020204030204" pitchFamily="34" charset="0"/>
+                      </a:endParaRPr>
+                    </a:p>
+                  </a:txBody>
+                  <a:tcPr marL="9525" marR="9525" marT="9525" marB="0" anchor="b"/>
+                </a:tc>
+                <a:tc>
+                  <a:txBody>
+                    <a:bodyPr/>
+                    <a:lstStyle/>
+                    <a:p>
+                      <a:pPr algn="l" fontAlgn="b"/>
+                      <a:r>
+                        <a:rPr lang="en-US" sz="1100" u="none" strike="noStrike" dirty="0">
+                          <a:effectLst/>
+                        </a:rPr>
+                        <a:t>42</a:t>
+                      </a:r>
+                      <a:endParaRPr lang="en-US" sz="1100" b="0" i="0" u="none" strike="noStrike" dirty="0">
+                        <a:solidFill>
+                          <a:srgbClr val="000000"/>
+                        </a:solidFill>
+                        <a:effectLst/>
+                        <a:latin typeface="Calibri" panose="020F0502020204030204" pitchFamily="34" charset="0"/>
+                      </a:endParaRPr>
+                    </a:p>
+                  </a:txBody>
+                  <a:tcPr marL="9525" marR="9525" marT="9525" marB="0" anchor="b"/>
+                </a:tc>
+                <a:extLst>
+                  <a:ext uri="{0D108BD9-81ED-4DB2-BD59-A6C34878D82A}">
+                    <a16:rowId xmlns:a16="http://schemas.microsoft.com/office/drawing/2014/main" val="3884156357"/>
+                  </a:ext>
+                </a:extLst>
+              </a:tr>
+              <a:tr h="190500">
+                <a:tc>
+                  <a:txBody>
+                    <a:bodyPr/>
+                    <a:lstStyle/>
+                    <a:p>
+                      <a:pPr algn="l" fontAlgn="b"/>
+                      <a:r>
+                        <a:rPr lang="en-US" sz="1100" u="none" strike="noStrike">
+                          <a:effectLst/>
+                        </a:rPr>
+                        <a:t>RelationshipSatisfaction |</a:t>
+                      </a:r>
+                      <a:endParaRPr lang="en-US" sz="1100" b="0" i="0" u="none" strike="noStrike">
+                        <a:solidFill>
+                          <a:srgbClr val="000000"/>
+                        </a:solidFill>
+                        <a:effectLst/>
+                        <a:latin typeface="Calibri" panose="020F0502020204030204" pitchFamily="34" charset="0"/>
+                      </a:endParaRPr>
+                    </a:p>
+                  </a:txBody>
+                  <a:tcPr marL="9525" marR="9525" marT="9525" marB="0" anchor="b"/>
+                </a:tc>
+                <a:tc>
+                  <a:txBody>
+                    <a:bodyPr/>
+                    <a:lstStyle/>
+                    <a:p>
+                      <a:pPr algn="l" fontAlgn="b"/>
+                      <a:r>
+                        <a:rPr lang="en-US" sz="1100" u="none" strike="noStrike">
+                          <a:effectLst/>
+                        </a:rPr>
+                        <a:t>4</a:t>
+                      </a:r>
+                      <a:endParaRPr lang="en-US" sz="1100" b="0" i="0" u="none" strike="noStrike">
+                        <a:solidFill>
+                          <a:srgbClr val="000000"/>
+                        </a:solidFill>
+                        <a:effectLst/>
+                        <a:latin typeface="Calibri" panose="020F0502020204030204" pitchFamily="34" charset="0"/>
+                      </a:endParaRPr>
+                    </a:p>
+                  </a:txBody>
+                  <a:tcPr marL="9525" marR="9525" marT="9525" marB="0" anchor="b"/>
+                </a:tc>
+                <a:tc>
+                  <a:txBody>
+                    <a:bodyPr/>
+                    <a:lstStyle/>
+                    <a:p>
+                      <a:pPr algn="l" fontAlgn="b"/>
+                      <a:r>
+                        <a:rPr lang="en-US" sz="1100" u="none" strike="noStrike" dirty="0">
+                          <a:effectLst/>
+                        </a:rPr>
+                        <a:t>42</a:t>
+                      </a:r>
+                      <a:endParaRPr lang="en-US" sz="1100" b="0" i="0" u="none" strike="noStrike" dirty="0">
+                        <a:solidFill>
+                          <a:srgbClr val="000000"/>
+                        </a:solidFill>
+                        <a:effectLst/>
+                        <a:latin typeface="Calibri" panose="020F0502020204030204" pitchFamily="34" charset="0"/>
+                      </a:endParaRPr>
+                    </a:p>
+                  </a:txBody>
+                  <a:tcPr marL="9525" marR="9525" marT="9525" marB="0" anchor="b"/>
+                </a:tc>
+                <a:extLst>
+                  <a:ext uri="{0D108BD9-81ED-4DB2-BD59-A6C34878D82A}">
+                    <a16:rowId xmlns:a16="http://schemas.microsoft.com/office/drawing/2014/main" val="1234290175"/>
+                  </a:ext>
+                </a:extLst>
+              </a:tr>
+              <a:tr h="190500">
+                <a:tc>
+                  <a:txBody>
+                    <a:bodyPr/>
+                    <a:lstStyle/>
+                    <a:p>
+                      <a:pPr algn="l" fontAlgn="b"/>
+                      <a:r>
+                        <a:rPr lang="en-US" sz="1100" u="none" strike="noStrike">
+                          <a:effectLst/>
+                        </a:rPr>
+                        <a:t>DistanceFromHome </a:t>
+                      </a:r>
+                      <a:endParaRPr lang="en-US" sz="1100" b="0" i="0" u="none" strike="noStrike">
+                        <a:solidFill>
+                          <a:srgbClr val="000000"/>
+                        </a:solidFill>
+                        <a:effectLst/>
+                        <a:latin typeface="Calibri" panose="020F0502020204030204" pitchFamily="34" charset="0"/>
+                      </a:endParaRPr>
+                    </a:p>
+                  </a:txBody>
+                  <a:tcPr marL="9525" marR="9525" marT="9525" marB="0" anchor="b"/>
+                </a:tc>
+                <a:tc>
+                  <a:txBody>
+                    <a:bodyPr/>
+                    <a:lstStyle/>
+                    <a:p>
+                      <a:pPr algn="l" fontAlgn="b"/>
+                      <a:r>
+                        <a:rPr lang="en-US" sz="1100" u="none" strike="noStrike">
+                          <a:effectLst/>
+                        </a:rPr>
+                        <a:t>1</a:t>
+                      </a:r>
+                      <a:endParaRPr lang="en-US" sz="1100" b="0" i="0" u="none" strike="noStrike">
+                        <a:solidFill>
+                          <a:srgbClr val="000000"/>
+                        </a:solidFill>
+                        <a:effectLst/>
+                        <a:latin typeface="Calibri" panose="020F0502020204030204" pitchFamily="34" charset="0"/>
+                      </a:endParaRPr>
+                    </a:p>
+                  </a:txBody>
+                  <a:tcPr marL="9525" marR="9525" marT="9525" marB="0" anchor="b"/>
+                </a:tc>
+                <a:tc>
+                  <a:txBody>
+                    <a:bodyPr/>
+                    <a:lstStyle/>
+                    <a:p>
+                      <a:pPr algn="l" fontAlgn="b"/>
+                      <a:r>
+                        <a:rPr lang="en-US" sz="1100" u="none" strike="noStrike" dirty="0">
+                          <a:effectLst/>
+                        </a:rPr>
+                        <a:t>17</a:t>
+                      </a:r>
+                      <a:endParaRPr lang="en-US" sz="1100" b="0" i="0" u="none" strike="noStrike" dirty="0">
+                        <a:solidFill>
+                          <a:srgbClr val="000000"/>
+                        </a:solidFill>
+                        <a:effectLst/>
+                        <a:latin typeface="Calibri" panose="020F0502020204030204" pitchFamily="34" charset="0"/>
+                      </a:endParaRPr>
+                    </a:p>
+                  </a:txBody>
+                  <a:tcPr marL="9525" marR="9525" marT="9525" marB="0" anchor="b"/>
+                </a:tc>
+                <a:extLst>
+                  <a:ext uri="{0D108BD9-81ED-4DB2-BD59-A6C34878D82A}">
+                    <a16:rowId xmlns:a16="http://schemas.microsoft.com/office/drawing/2014/main" val="2746735889"/>
+                  </a:ext>
+                </a:extLst>
+              </a:tr>
+              <a:tr h="190500">
+                <a:tc>
+                  <a:txBody>
+                    <a:bodyPr/>
+                    <a:lstStyle/>
+                    <a:p>
+                      <a:pPr algn="l" fontAlgn="b"/>
+                      <a:r>
+                        <a:rPr lang="en-US" sz="1100" u="none" strike="noStrike">
+                          <a:effectLst/>
+                        </a:rPr>
+                        <a:t>Age</a:t>
+                      </a:r>
+                      <a:endParaRPr lang="en-US" sz="1100" b="0" i="0" u="none" strike="noStrike">
+                        <a:solidFill>
+                          <a:srgbClr val="000000"/>
+                        </a:solidFill>
+                        <a:effectLst/>
+                        <a:latin typeface="Calibri" panose="020F0502020204030204" pitchFamily="34" charset="0"/>
+                      </a:endParaRPr>
+                    </a:p>
+                  </a:txBody>
+                  <a:tcPr marL="9525" marR="9525" marT="9525" marB="0" anchor="b"/>
+                </a:tc>
+                <a:tc>
+                  <a:txBody>
+                    <a:bodyPr/>
+                    <a:lstStyle/>
+                    <a:p>
+                      <a:pPr algn="l" fontAlgn="b"/>
+                      <a:r>
+                        <a:rPr lang="en-US" sz="1100" u="none" strike="noStrike">
+                          <a:effectLst/>
+                        </a:rPr>
+                        <a:t>29</a:t>
+                      </a:r>
+                      <a:endParaRPr lang="en-US" sz="1100" b="0" i="0" u="none" strike="noStrike">
+                        <a:solidFill>
+                          <a:srgbClr val="000000"/>
+                        </a:solidFill>
+                        <a:effectLst/>
+                        <a:latin typeface="Calibri" panose="020F0502020204030204" pitchFamily="34" charset="0"/>
+                      </a:endParaRPr>
+                    </a:p>
+                  </a:txBody>
+                  <a:tcPr marL="9525" marR="9525" marT="9525" marB="0" anchor="b"/>
+                </a:tc>
+                <a:tc>
+                  <a:txBody>
+                    <a:bodyPr/>
+                    <a:lstStyle/>
+                    <a:p>
+                      <a:pPr algn="l" fontAlgn="b"/>
+                      <a:r>
+                        <a:rPr lang="en-US" sz="1100" u="none" strike="noStrike" dirty="0">
+                          <a:effectLst/>
+                        </a:rPr>
+                        <a:t>12</a:t>
+                      </a:r>
+                      <a:endParaRPr lang="en-US" sz="1100" b="0" i="0" u="none" strike="noStrike" dirty="0">
+                        <a:solidFill>
+                          <a:srgbClr val="000000"/>
+                        </a:solidFill>
+                        <a:effectLst/>
+                        <a:latin typeface="Calibri" panose="020F0502020204030204" pitchFamily="34" charset="0"/>
+                      </a:endParaRPr>
+                    </a:p>
+                  </a:txBody>
+                  <a:tcPr marL="9525" marR="9525" marT="9525" marB="0" anchor="b"/>
+                </a:tc>
+                <a:extLst>
+                  <a:ext uri="{0D108BD9-81ED-4DB2-BD59-A6C34878D82A}">
+                    <a16:rowId xmlns:a16="http://schemas.microsoft.com/office/drawing/2014/main" val="3755299647"/>
+                  </a:ext>
+                </a:extLst>
+              </a:tr>
+            </a:tbl>
+          </a:graphicData>
+        </a:graphic>
+      </p:graphicFrame>
     </p:spTree>
     <p:extLst>
       <p:ext uri="{BB962C8B-B14F-4D97-AF65-F5344CB8AC3E}">
@@ -3790,6 +6210,252 @@
     <p:extLst>
       <p:ext uri="{BB962C8B-B14F-4D97-AF65-F5344CB8AC3E}">
         <p14:creationId xmlns:p14="http://schemas.microsoft.com/office/powerpoint/2010/main" val="2293073141"/>
+      </p:ext>
+    </p:extLst>
+  </p:cSld>
+  <p:clrMapOvr>
+    <a:masterClrMapping/>
+  </p:clrMapOvr>
+</p:sld>
+</file>
+
+<file path=ppt/slides/slide6.xml><?xml version="1.0" encoding="utf-8"?>
+<p:sld xmlns:a="http://schemas.openxmlformats.org/drawingml/2006/main" xmlns:r="http://schemas.openxmlformats.org/officeDocument/2006/relationships" xmlns:p="http://schemas.openxmlformats.org/presentationml/2006/main">
+  <p:cSld>
+    <p:spTree>
+      <p:nvGrpSpPr>
+        <p:cNvPr id="1" name=""/>
+        <p:cNvGrpSpPr/>
+        <p:nvPr/>
+      </p:nvGrpSpPr>
+      <p:grpSpPr>
+        <a:xfrm>
+          <a:off x="0" y="0"/>
+          <a:ext cx="0" cy="0"/>
+          <a:chOff x="0" y="0"/>
+          <a:chExt cx="0" cy="0"/>
+        </a:xfrm>
+      </p:grpSpPr>
+      <p:sp>
+        <p:nvSpPr>
+          <p:cNvPr id="2" name="Title 1">
+            <a:extLst>
+              <a:ext uri="{FF2B5EF4-FFF2-40B4-BE49-F238E27FC236}">
+                <a16:creationId xmlns:a16="http://schemas.microsoft.com/office/drawing/2014/main" id="{8D8F2932-E077-4509-B2E4-6335389C5E25}"/>
+              </a:ext>
+            </a:extLst>
+          </p:cNvPr>
+          <p:cNvSpPr>
+            <a:spLocks noGrp="1"/>
+          </p:cNvSpPr>
+          <p:nvPr>
+            <p:ph type="title"/>
+          </p:nvPr>
+        </p:nvSpPr>
+        <p:spPr>
+          <a:xfrm>
+            <a:off x="838200" y="365126"/>
+            <a:ext cx="10515600" cy="560292"/>
+          </a:xfrm>
+        </p:spPr>
+        <p:txBody>
+          <a:bodyPr>
+            <a:normAutofit fontScale="90000"/>
+          </a:bodyPr>
+          <a:lstStyle/>
+          <a:p>
+            <a:r>
+              <a:rPr lang="en-US" dirty="0"/>
+              <a:t>Salary Prediction</a:t>
+            </a:r>
+          </a:p>
+        </p:txBody>
+      </p:sp>
+      <p:sp>
+        <p:nvSpPr>
+          <p:cNvPr id="3" name="Content Placeholder 2">
+            <a:extLst>
+              <a:ext uri="{FF2B5EF4-FFF2-40B4-BE49-F238E27FC236}">
+                <a16:creationId xmlns:a16="http://schemas.microsoft.com/office/drawing/2014/main" id="{84D0A1D8-2F55-413E-890D-ACC91BAECF8F}"/>
+              </a:ext>
+            </a:extLst>
+          </p:cNvPr>
+          <p:cNvSpPr>
+            <a:spLocks noGrp="1"/>
+          </p:cNvSpPr>
+          <p:nvPr>
+            <p:ph idx="1"/>
+          </p:nvPr>
+        </p:nvSpPr>
+        <p:spPr>
+          <a:xfrm>
+            <a:off x="838200" y="1253331"/>
+            <a:ext cx="3160923" cy="4114286"/>
+          </a:xfrm>
+        </p:spPr>
+        <p:txBody>
+          <a:bodyPr>
+            <a:normAutofit/>
+          </a:bodyPr>
+          <a:lstStyle/>
+          <a:p>
+            <a:pPr marL="0" indent="0">
+              <a:buNone/>
+            </a:pPr>
+            <a:r>
+              <a:rPr lang="en-US" sz="1800" dirty="0"/>
+              <a:t>Residual standard error: 1414 on 867 degrees of freedom</a:t>
+            </a:r>
+          </a:p>
+        </p:txBody>
+      </p:sp>
+      <p:pic>
+        <p:nvPicPr>
+          <p:cNvPr id="6" name="Picture 5">
+            <a:extLst>
+              <a:ext uri="{FF2B5EF4-FFF2-40B4-BE49-F238E27FC236}">
+                <a16:creationId xmlns:a16="http://schemas.microsoft.com/office/drawing/2014/main" id="{D600CD1C-C1B7-422F-BB6B-5B13B17A7E66}"/>
+              </a:ext>
+            </a:extLst>
+          </p:cNvPr>
+          <p:cNvPicPr>
+            <a:picLocks noChangeAspect="1"/>
+          </p:cNvPicPr>
+          <p:nvPr/>
+        </p:nvPicPr>
+        <p:blipFill>
+          <a:blip r:embed="rId2"/>
+          <a:stretch>
+            <a:fillRect/>
+          </a:stretch>
+        </p:blipFill>
+        <p:spPr>
+          <a:xfrm>
+            <a:off x="4105799" y="953217"/>
+            <a:ext cx="7934532" cy="5414532"/>
+          </a:xfrm>
+          <a:prstGeom prst="rect">
+            <a:avLst/>
+          </a:prstGeom>
+        </p:spPr>
+      </p:pic>
+    </p:spTree>
+    <p:extLst>
+      <p:ext uri="{BB962C8B-B14F-4D97-AF65-F5344CB8AC3E}">
+        <p14:creationId xmlns:p14="http://schemas.microsoft.com/office/powerpoint/2010/main" val="3187377310"/>
+      </p:ext>
+    </p:extLst>
+  </p:cSld>
+  <p:clrMapOvr>
+    <a:masterClrMapping/>
+  </p:clrMapOvr>
+</p:sld>
+</file>
+
+<file path=ppt/slides/slide7.xml><?xml version="1.0" encoding="utf-8"?>
+<p:sld xmlns:a="http://schemas.openxmlformats.org/drawingml/2006/main" xmlns:r="http://schemas.openxmlformats.org/officeDocument/2006/relationships" xmlns:p="http://schemas.openxmlformats.org/presentationml/2006/main">
+  <p:cSld>
+    <p:spTree>
+      <p:nvGrpSpPr>
+        <p:cNvPr id="1" name=""/>
+        <p:cNvGrpSpPr/>
+        <p:nvPr/>
+      </p:nvGrpSpPr>
+      <p:grpSpPr>
+        <a:xfrm>
+          <a:off x="0" y="0"/>
+          <a:ext cx="0" cy="0"/>
+          <a:chOff x="0" y="0"/>
+          <a:chExt cx="0" cy="0"/>
+        </a:xfrm>
+      </p:grpSpPr>
+      <p:sp>
+        <p:nvSpPr>
+          <p:cNvPr id="2" name="Title 1">
+            <a:extLst>
+              <a:ext uri="{FF2B5EF4-FFF2-40B4-BE49-F238E27FC236}">
+                <a16:creationId xmlns:a16="http://schemas.microsoft.com/office/drawing/2014/main" id="{8E7CE479-91E6-4FB8-9EAC-874F58BDA0E9}"/>
+              </a:ext>
+            </a:extLst>
+          </p:cNvPr>
+          <p:cNvSpPr>
+            <a:spLocks noGrp="1"/>
+          </p:cNvSpPr>
+          <p:nvPr>
+            <p:ph type="title"/>
+          </p:nvPr>
+        </p:nvSpPr>
+        <p:spPr/>
+        <p:txBody>
+          <a:bodyPr/>
+          <a:lstStyle/>
+          <a:p>
+            <a:r>
+              <a:rPr lang="en-US" dirty="0"/>
+              <a:t>Recap</a:t>
+            </a:r>
+          </a:p>
+        </p:txBody>
+      </p:sp>
+      <p:sp>
+        <p:nvSpPr>
+          <p:cNvPr id="3" name="Content Placeholder 2">
+            <a:extLst>
+              <a:ext uri="{FF2B5EF4-FFF2-40B4-BE49-F238E27FC236}">
+                <a16:creationId xmlns:a16="http://schemas.microsoft.com/office/drawing/2014/main" id="{1F0F9A51-0DD9-4472-8768-F6735899A7BE}"/>
+              </a:ext>
+            </a:extLst>
+          </p:cNvPr>
+          <p:cNvSpPr>
+            <a:spLocks noGrp="1"/>
+          </p:cNvSpPr>
+          <p:nvPr>
+            <p:ph idx="1"/>
+          </p:nvPr>
+        </p:nvSpPr>
+        <p:spPr/>
+        <p:txBody>
+          <a:bodyPr/>
+          <a:lstStyle/>
+          <a:p>
+            <a:r>
+              <a:rPr lang="en-US" dirty="0"/>
+              <a:t>Top 3 Attrition Factors</a:t>
+            </a:r>
+          </a:p>
+          <a:p>
+            <a:r>
+              <a:rPr lang="en-US" dirty="0"/>
+              <a:t>Job Role Trend</a:t>
+            </a:r>
+          </a:p>
+          <a:p>
+            <a:r>
+              <a:rPr lang="en-US" dirty="0"/>
+              <a:t>Points System</a:t>
+            </a:r>
+          </a:p>
+          <a:p>
+            <a:r>
+              <a:rPr lang="en-US" dirty="0"/>
+              <a:t>Model Accuracy to Predict Attrition</a:t>
+            </a:r>
+          </a:p>
+          <a:p>
+            <a:r>
+              <a:rPr lang="en-US" dirty="0"/>
+              <a:t>Model Accuracy to Predict Salary</a:t>
+            </a:r>
+          </a:p>
+          <a:p>
+            <a:endParaRPr lang="en-US" dirty="0"/>
+          </a:p>
+        </p:txBody>
+      </p:sp>
+    </p:spTree>
+    <p:extLst>
+      <p:ext uri="{BB962C8B-B14F-4D97-AF65-F5344CB8AC3E}">
+        <p14:creationId xmlns:p14="http://schemas.microsoft.com/office/powerpoint/2010/main" val="3405338430"/>
       </p:ext>
     </p:extLst>
   </p:cSld>

</xml_diff>